<commit_message>
parameters and presentation in progress
</commit_message>
<xml_diff>
--- a/2401-parkingPricing.pptx
+++ b/2401-parkingPricing.pptx
@@ -5,10 +5,10 @@
     <p:sldMasterId id="2147483648" r:id="rId1"/>
   </p:sldMasterIdLst>
   <p:notesMasterIdLst>
-    <p:notesMasterId r:id="rId18"/>
+    <p:notesMasterId r:id="rId20"/>
   </p:notesMasterIdLst>
   <p:handoutMasterIdLst>
-    <p:handoutMasterId r:id="rId19"/>
+    <p:handoutMasterId r:id="rId21"/>
   </p:handoutMasterIdLst>
   <p:sldIdLst>
     <p:sldId id="270" r:id="rId2"/>
@@ -21,12 +21,14 @@
     <p:sldId id="285" r:id="rId9"/>
     <p:sldId id="283" r:id="rId10"/>
     <p:sldId id="273" r:id="rId11"/>
-    <p:sldId id="261" r:id="rId12"/>
-    <p:sldId id="262" r:id="rId13"/>
-    <p:sldId id="281" r:id="rId14"/>
-    <p:sldId id="260" r:id="rId15"/>
-    <p:sldId id="268" r:id="rId16"/>
-    <p:sldId id="269" r:id="rId17"/>
+    <p:sldId id="286" r:id="rId12"/>
+    <p:sldId id="287" r:id="rId13"/>
+    <p:sldId id="261" r:id="rId14"/>
+    <p:sldId id="262" r:id="rId15"/>
+    <p:sldId id="281" r:id="rId16"/>
+    <p:sldId id="260" r:id="rId17"/>
+    <p:sldId id="268" r:id="rId18"/>
+    <p:sldId id="269" r:id="rId19"/>
   </p:sldIdLst>
   <p:sldSz cx="12192000" cy="6858000"/>
   <p:notesSz cx="6805613" cy="9939338"/>
@@ -218,7 +220,7 @@
           <a:p>
             <a:fld id="{770F5CD0-F302-4CC7-BE79-B338993F3CC4}" type="datetimeFigureOut">
               <a:rPr lang="en-US" smtClean="0"/>
-              <a:t>4/18/2024</a:t>
+              <a:t>4/24/2024</a:t>
             </a:fld>
             <a:endParaRPr lang="en-US"/>
           </a:p>
@@ -383,7 +385,7 @@
           <a:p>
             <a:fld id="{6A2B2D66-1975-4E83-8EF3-59B2DA23E68B}" type="datetimeFigureOut">
               <a:rPr lang="en-US" smtClean="0"/>
-              <a:t>4/18/2024</a:t>
+              <a:t>4/24/2024</a:t>
             </a:fld>
             <a:endParaRPr lang="en-US"/>
           </a:p>
@@ -1109,7 +1111,175 @@
           <a:p>
             <a:fld id="{FABF08CD-1811-4EF5-9925-2B278A90E7D7}" type="slidenum">
               <a:rPr lang="en-US" smtClean="0"/>
-              <a:t>13</a:t>
+              <a:t>11</a:t>
+            </a:fld>
+            <a:endParaRPr lang="en-US"/>
+          </a:p>
+        </p:txBody>
+      </p:sp>
+    </p:spTree>
+    <p:extLst>
+      <p:ext uri="{BB962C8B-B14F-4D97-AF65-F5344CB8AC3E}">
+        <p14:creationId xmlns:p14="http://schemas.microsoft.com/office/powerpoint/2010/main" val="4205064291"/>
+      </p:ext>
+    </p:extLst>
+  </p:cSld>
+  <p:clrMapOvr>
+    <a:masterClrMapping/>
+  </p:clrMapOvr>
+</p:notes>
+</file>
+
+<file path=ppt/notesSlides/notesSlide6.xml><?xml version="1.0" encoding="utf-8"?>
+<p:notes xmlns:a="http://schemas.openxmlformats.org/drawingml/2006/main" xmlns:r="http://schemas.openxmlformats.org/officeDocument/2006/relationships" xmlns:p="http://schemas.openxmlformats.org/presentationml/2006/main">
+  <p:cSld>
+    <p:spTree>
+      <p:nvGrpSpPr>
+        <p:cNvPr id="1" name=""/>
+        <p:cNvGrpSpPr/>
+        <p:nvPr/>
+      </p:nvGrpSpPr>
+      <p:grpSpPr>
+        <a:xfrm>
+          <a:off x="0" y="0"/>
+          <a:ext cx="0" cy="0"/>
+          <a:chOff x="0" y="0"/>
+          <a:chExt cx="0" cy="0"/>
+        </a:xfrm>
+      </p:grpSpPr>
+      <p:sp>
+        <p:nvSpPr>
+          <p:cNvPr id="2" name="幻灯片图像占位符 1"/>
+          <p:cNvSpPr>
+            <a:spLocks noGrp="1" noRot="1" noChangeAspect="1"/>
+          </p:cNvSpPr>
+          <p:nvPr>
+            <p:ph type="sldImg"/>
+          </p:nvPr>
+        </p:nvSpPr>
+        <p:spPr/>
+      </p:sp>
+      <p:sp>
+        <p:nvSpPr>
+          <p:cNvPr id="3" name="备注占位符 2"/>
+          <p:cNvSpPr>
+            <a:spLocks noGrp="1"/>
+          </p:cNvSpPr>
+          <p:nvPr>
+            <p:ph type="body" idx="1"/>
+          </p:nvPr>
+        </p:nvSpPr>
+        <p:spPr/>
+        <p:txBody>
+          <a:bodyPr/>
+          <a:lstStyle/>
+          <a:p>
+            <a:endParaRPr lang="en-US" dirty="0"/>
+          </a:p>
+        </p:txBody>
+      </p:sp>
+      <p:sp>
+        <p:nvSpPr>
+          <p:cNvPr id="4" name="灯片编号占位符 3"/>
+          <p:cNvSpPr>
+            <a:spLocks noGrp="1"/>
+          </p:cNvSpPr>
+          <p:nvPr>
+            <p:ph type="sldNum" sz="quarter" idx="10"/>
+          </p:nvPr>
+        </p:nvSpPr>
+        <p:spPr/>
+        <p:txBody>
+          <a:bodyPr/>
+          <a:lstStyle/>
+          <a:p>
+            <a:fld id="{FABF08CD-1811-4EF5-9925-2B278A90E7D7}" type="slidenum">
+              <a:rPr lang="en-US" smtClean="0"/>
+              <a:t>12</a:t>
+            </a:fld>
+            <a:endParaRPr lang="en-US"/>
+          </a:p>
+        </p:txBody>
+      </p:sp>
+    </p:spTree>
+    <p:extLst>
+      <p:ext uri="{BB962C8B-B14F-4D97-AF65-F5344CB8AC3E}">
+        <p14:creationId xmlns:p14="http://schemas.microsoft.com/office/powerpoint/2010/main" val="2257381042"/>
+      </p:ext>
+    </p:extLst>
+  </p:cSld>
+  <p:clrMapOvr>
+    <a:masterClrMapping/>
+  </p:clrMapOvr>
+</p:notes>
+</file>
+
+<file path=ppt/notesSlides/notesSlide7.xml><?xml version="1.0" encoding="utf-8"?>
+<p:notes xmlns:a="http://schemas.openxmlformats.org/drawingml/2006/main" xmlns:r="http://schemas.openxmlformats.org/officeDocument/2006/relationships" xmlns:p="http://schemas.openxmlformats.org/presentationml/2006/main">
+  <p:cSld>
+    <p:spTree>
+      <p:nvGrpSpPr>
+        <p:cNvPr id="1" name=""/>
+        <p:cNvGrpSpPr/>
+        <p:nvPr/>
+      </p:nvGrpSpPr>
+      <p:grpSpPr>
+        <a:xfrm>
+          <a:off x="0" y="0"/>
+          <a:ext cx="0" cy="0"/>
+          <a:chOff x="0" y="0"/>
+          <a:chExt cx="0" cy="0"/>
+        </a:xfrm>
+      </p:grpSpPr>
+      <p:sp>
+        <p:nvSpPr>
+          <p:cNvPr id="2" name="幻灯片图像占位符 1"/>
+          <p:cNvSpPr>
+            <a:spLocks noGrp="1" noRot="1" noChangeAspect="1"/>
+          </p:cNvSpPr>
+          <p:nvPr>
+            <p:ph type="sldImg"/>
+          </p:nvPr>
+        </p:nvSpPr>
+        <p:spPr/>
+      </p:sp>
+      <p:sp>
+        <p:nvSpPr>
+          <p:cNvPr id="3" name="备注占位符 2"/>
+          <p:cNvSpPr>
+            <a:spLocks noGrp="1"/>
+          </p:cNvSpPr>
+          <p:nvPr>
+            <p:ph type="body" idx="1"/>
+          </p:nvPr>
+        </p:nvSpPr>
+        <p:spPr/>
+        <p:txBody>
+          <a:bodyPr/>
+          <a:lstStyle/>
+          <a:p>
+            <a:endParaRPr lang="en-US" dirty="0"/>
+          </a:p>
+        </p:txBody>
+      </p:sp>
+      <p:sp>
+        <p:nvSpPr>
+          <p:cNvPr id="4" name="灯片编号占位符 3"/>
+          <p:cNvSpPr>
+            <a:spLocks noGrp="1"/>
+          </p:cNvSpPr>
+          <p:nvPr>
+            <p:ph type="sldNum" sz="quarter" idx="10"/>
+          </p:nvPr>
+        </p:nvSpPr>
+        <p:spPr/>
+        <p:txBody>
+          <a:bodyPr/>
+          <a:lstStyle/>
+          <a:p>
+            <a:fld id="{FABF08CD-1811-4EF5-9925-2B278A90E7D7}" type="slidenum">
+              <a:rPr lang="en-US" smtClean="0"/>
+              <a:t>15</a:t>
             </a:fld>
             <a:endParaRPr lang="en-US"/>
           </a:p>
@@ -1267,7 +1437,7 @@
           <a:p>
             <a:fld id="{701846CD-220F-4474-96C9-8CB5FFF34221}" type="datetimeFigureOut">
               <a:rPr lang="en-US" smtClean="0"/>
-              <a:t>4/18/2024</a:t>
+              <a:t>4/24/2024</a:t>
             </a:fld>
             <a:endParaRPr lang="en-US"/>
           </a:p>
@@ -1478,7 +1648,7 @@
           <a:p>
             <a:fld id="{701846CD-220F-4474-96C9-8CB5FFF34221}" type="datetimeFigureOut">
               <a:rPr lang="en-US" smtClean="0"/>
-              <a:t>4/18/2024</a:t>
+              <a:t>4/24/2024</a:t>
             </a:fld>
             <a:endParaRPr lang="en-US"/>
           </a:p>
@@ -1682,7 +1852,7 @@
           <a:p>
             <a:fld id="{701846CD-220F-4474-96C9-8CB5FFF34221}" type="datetimeFigureOut">
               <a:rPr lang="en-US" smtClean="0"/>
-              <a:t>4/18/2024</a:t>
+              <a:t>4/24/2024</a:t>
             </a:fld>
             <a:endParaRPr lang="en-US"/>
           </a:p>
@@ -1908,7 +2078,7 @@
           <a:p>
             <a:fld id="{701846CD-220F-4474-96C9-8CB5FFF34221}" type="datetimeFigureOut">
               <a:rPr lang="en-US" smtClean="0"/>
-              <a:t>4/18/2024</a:t>
+              <a:t>4/24/2024</a:t>
             </a:fld>
             <a:endParaRPr lang="en-US"/>
           </a:p>
@@ -2181,7 +2351,7 @@
           <a:p>
             <a:fld id="{701846CD-220F-4474-96C9-8CB5FFF34221}" type="datetimeFigureOut">
               <a:rPr lang="en-US" smtClean="0"/>
-              <a:t>4/18/2024</a:t>
+              <a:t>4/24/2024</a:t>
             </a:fld>
             <a:endParaRPr lang="en-US"/>
           </a:p>
@@ -2437,7 +2607,7 @@
           <a:p>
             <a:fld id="{701846CD-220F-4474-96C9-8CB5FFF34221}" type="datetimeFigureOut">
               <a:rPr lang="en-US" smtClean="0"/>
-              <a:t>4/18/2024</a:t>
+              <a:t>4/24/2024</a:t>
             </a:fld>
             <a:endParaRPr lang="en-US"/>
           </a:p>
@@ -2828,7 +2998,7 @@
           <a:p>
             <a:fld id="{701846CD-220F-4474-96C9-8CB5FFF34221}" type="datetimeFigureOut">
               <a:rPr lang="en-US" smtClean="0"/>
-              <a:t>4/18/2024</a:t>
+              <a:t>4/24/2024</a:t>
             </a:fld>
             <a:endParaRPr lang="en-US"/>
           </a:p>
@@ -2970,7 +3140,7 @@
           <a:p>
             <a:fld id="{701846CD-220F-4474-96C9-8CB5FFF34221}" type="datetimeFigureOut">
               <a:rPr lang="en-US" smtClean="0"/>
-              <a:t>4/18/2024</a:t>
+              <a:t>4/24/2024</a:t>
             </a:fld>
             <a:endParaRPr lang="en-US"/>
           </a:p>
@@ -3089,7 +3259,7 @@
           <a:p>
             <a:fld id="{701846CD-220F-4474-96C9-8CB5FFF34221}" type="datetimeFigureOut">
               <a:rPr lang="en-US" smtClean="0"/>
-              <a:t>4/18/2024</a:t>
+              <a:t>4/24/2024</a:t>
             </a:fld>
             <a:endParaRPr lang="en-US"/>
           </a:p>
@@ -3390,7 +3560,7 @@
           <a:p>
             <a:fld id="{701846CD-220F-4474-96C9-8CB5FFF34221}" type="datetimeFigureOut">
               <a:rPr lang="en-US" smtClean="0"/>
-              <a:t>4/18/2024</a:t>
+              <a:t>4/24/2024</a:t>
             </a:fld>
             <a:endParaRPr lang="en-US"/>
           </a:p>
@@ -3667,7 +3837,7 @@
           <a:p>
             <a:fld id="{701846CD-220F-4474-96C9-8CB5FFF34221}" type="datetimeFigureOut">
               <a:rPr lang="en-US" smtClean="0"/>
-              <a:t>4/18/2024</a:t>
+              <a:t>4/24/2024</a:t>
             </a:fld>
             <a:endParaRPr lang="en-US"/>
           </a:p>
@@ -4867,9 +5037,251 @@
           <a:chExt cx="0" cy="0"/>
         </a:xfrm>
       </p:grpSpPr>
-      <p:sp>
-        <p:nvSpPr>
-          <p:cNvPr id="4" name="标题 3"/>
+      <p:pic>
+        <p:nvPicPr>
+          <p:cNvPr id="2" name="图片 1"/>
+          <p:cNvPicPr>
+            <a:picLocks noChangeAspect="1"/>
+          </p:cNvPicPr>
+          <p:nvPr/>
+        </p:nvPicPr>
+        <p:blipFill rotWithShape="1">
+          <a:blip r:embed="rId3" cstate="print">
+            <a:extLst>
+              <a:ext uri="{28A0092B-C50C-407E-A947-70E740481C1C}">
+                <a14:useLocalDpi xmlns:a14="http://schemas.microsoft.com/office/drawing/2010/main" val="0"/>
+              </a:ext>
+            </a:extLst>
+          </a:blip>
+          <a:srcRect l="8758" t="1143" r="15594" b="13302"/>
+          <a:stretch/>
+        </p:blipFill>
+        <p:spPr>
+          <a:xfrm>
+            <a:off x="3962400" y="677045"/>
+            <a:ext cx="7781925" cy="5867400"/>
+          </a:xfrm>
+          <a:prstGeom prst="rect">
+            <a:avLst/>
+          </a:prstGeom>
+        </p:spPr>
+      </p:pic>
+      <p:grpSp>
+        <p:nvGrpSpPr>
+          <p:cNvPr id="7" name="组合 6"/>
+          <p:cNvGrpSpPr/>
+          <p:nvPr/>
+        </p:nvGrpSpPr>
+        <p:grpSpPr>
+          <a:xfrm>
+            <a:off x="4452130" y="4748752"/>
+            <a:ext cx="751520" cy="1244244"/>
+            <a:chOff x="2746410" y="1549395"/>
+            <a:chExt cx="751520" cy="1244244"/>
+          </a:xfrm>
+        </p:grpSpPr>
+        <p:sp>
+          <p:nvSpPr>
+            <p:cNvPr id="8" name="矩形 7"/>
+            <p:cNvSpPr/>
+            <p:nvPr/>
+          </p:nvSpPr>
+          <p:spPr>
+            <a:xfrm>
+              <a:off x="2746410" y="1631097"/>
+              <a:ext cx="137160" cy="1104900"/>
+            </a:xfrm>
+            <a:prstGeom prst="rect">
+              <a:avLst/>
+            </a:prstGeom>
+            <a:gradFill>
+              <a:gsLst>
+                <a:gs pos="0">
+                  <a:srgbClr val="FF0000"/>
+                </a:gs>
+                <a:gs pos="100000">
+                  <a:srgbClr val="002060"/>
+                </a:gs>
+              </a:gsLst>
+              <a:lin ang="5400000" scaled="1"/>
+            </a:gradFill>
+            <a:ln>
+              <a:noFill/>
+            </a:ln>
+          </p:spPr>
+          <p:style>
+            <a:lnRef idx="2">
+              <a:schemeClr val="accent1">
+                <a:shade val="50000"/>
+              </a:schemeClr>
+            </a:lnRef>
+            <a:fillRef idx="1">
+              <a:schemeClr val="accent1"/>
+            </a:fillRef>
+            <a:effectRef idx="0">
+              <a:schemeClr val="accent1"/>
+            </a:effectRef>
+            <a:fontRef idx="minor">
+              <a:schemeClr val="lt1"/>
+            </a:fontRef>
+          </p:style>
+          <p:txBody>
+            <a:bodyPr rtlCol="0" anchor="ctr"/>
+            <a:lstStyle/>
+            <a:p>
+              <a:pPr algn="ctr"/>
+              <a:endParaRPr lang="en-US"/>
+            </a:p>
+          </p:txBody>
+        </p:sp>
+        <p:sp>
+          <p:nvSpPr>
+            <p:cNvPr id="9" name="矩形 8"/>
+            <p:cNvSpPr/>
+            <p:nvPr/>
+          </p:nvSpPr>
+          <p:spPr>
+            <a:xfrm>
+              <a:off x="2890071" y="1549395"/>
+              <a:ext cx="607859" cy="261610"/>
+            </a:xfrm>
+            <a:prstGeom prst="rect">
+              <a:avLst/>
+            </a:prstGeom>
+          </p:spPr>
+          <p:txBody>
+            <a:bodyPr wrap="none">
+              <a:spAutoFit/>
+            </a:bodyPr>
+            <a:lstStyle/>
+            <a:p>
+              <a:pPr algn="r"/>
+              <a:r>
+                <a:rPr lang="zh-CN" altLang="en-US" sz="1050" dirty="0" smtClean="0"/>
+                <a:t>价格高</a:t>
+              </a:r>
+              <a:endParaRPr lang="en-US" sz="1050" dirty="0"/>
+            </a:p>
+          </p:txBody>
+        </p:sp>
+        <p:sp>
+          <p:nvSpPr>
+            <p:cNvPr id="10" name="矩形 9"/>
+            <p:cNvSpPr/>
+            <p:nvPr/>
+          </p:nvSpPr>
+          <p:spPr>
+            <a:xfrm>
+              <a:off x="2894299" y="2539723"/>
+              <a:ext cx="588624" cy="253916"/>
+            </a:xfrm>
+            <a:prstGeom prst="rect">
+              <a:avLst/>
+            </a:prstGeom>
+          </p:spPr>
+          <p:txBody>
+            <a:bodyPr wrap="none">
+              <a:spAutoFit/>
+            </a:bodyPr>
+            <a:lstStyle/>
+            <a:p>
+              <a:pPr algn="r"/>
+              <a:r>
+                <a:rPr lang="zh-CN" altLang="en-US" sz="1050" dirty="0" smtClean="0"/>
+                <a:t>价格低</a:t>
+              </a:r>
+              <a:endParaRPr lang="en-US" sz="1050" dirty="0"/>
+            </a:p>
+          </p:txBody>
+        </p:sp>
+      </p:grpSp>
+      <p:sp>
+        <p:nvSpPr>
+          <p:cNvPr id="11" name="圆角矩形 10"/>
+          <p:cNvSpPr/>
+          <p:nvPr/>
+        </p:nvSpPr>
+        <p:spPr>
+          <a:xfrm>
+            <a:off x="4366717" y="842241"/>
+            <a:ext cx="2829703" cy="2215284"/>
+          </a:xfrm>
+          <a:prstGeom prst="roundRect">
+            <a:avLst/>
+          </a:prstGeom>
+          <a:noFill/>
+          <a:ln>
+            <a:solidFill>
+              <a:schemeClr val="bg1"/>
+            </a:solidFill>
+            <a:prstDash val="sysDash"/>
+          </a:ln>
+        </p:spPr>
+        <p:style>
+          <a:lnRef idx="2">
+            <a:schemeClr val="accent1">
+              <a:shade val="50000"/>
+            </a:schemeClr>
+          </a:lnRef>
+          <a:fillRef idx="1">
+            <a:schemeClr val="accent1"/>
+          </a:fillRef>
+          <a:effectRef idx="0">
+            <a:schemeClr val="accent1"/>
+          </a:effectRef>
+          <a:fontRef idx="minor">
+            <a:schemeClr val="lt1"/>
+          </a:fontRef>
+        </p:style>
+        <p:txBody>
+          <a:bodyPr rtlCol="0" anchor="ctr"/>
+          <a:lstStyle/>
+          <a:p>
+            <a:pPr algn="ctr"/>
+            <a:endParaRPr lang="en-US"/>
+          </a:p>
+        </p:txBody>
+      </p:sp>
+      <p:sp>
+        <p:nvSpPr>
+          <p:cNvPr id="12" name="矩形 11"/>
+          <p:cNvSpPr/>
+          <p:nvPr/>
+        </p:nvSpPr>
+        <p:spPr>
+          <a:xfrm>
+            <a:off x="4452130" y="2175389"/>
+            <a:ext cx="1281134" cy="584775"/>
+          </a:xfrm>
+          <a:prstGeom prst="rect">
+            <a:avLst/>
+          </a:prstGeom>
+        </p:spPr>
+        <p:txBody>
+          <a:bodyPr wrap="square">
+            <a:spAutoFit/>
+          </a:bodyPr>
+          <a:lstStyle/>
+          <a:p>
+            <a:r>
+              <a:rPr lang="zh-CN" altLang="en-US" sz="1600" dirty="0" smtClean="0">
+                <a:solidFill>
+                  <a:schemeClr val="bg1"/>
+                </a:solidFill>
+              </a:rPr>
+              <a:t>洋房区车位价格实现高</a:t>
+            </a:r>
+            <a:endParaRPr lang="en-US" sz="1600" dirty="0">
+              <a:solidFill>
+                <a:schemeClr val="bg1"/>
+              </a:solidFill>
+            </a:endParaRPr>
+          </a:p>
+        </p:txBody>
+      </p:sp>
+      <p:sp>
+        <p:nvSpPr>
+          <p:cNvPr id="14" name="标题 13"/>
           <p:cNvSpPr>
             <a:spLocks noGrp="1"/>
           </p:cNvSpPr>
@@ -4877,220 +5289,67 @@
             <p:ph type="title"/>
           </p:nvPr>
         </p:nvSpPr>
-        <p:spPr/>
+        <p:spPr>
+          <a:xfrm>
+            <a:off x="838200" y="365126"/>
+            <a:ext cx="2638425" cy="623839"/>
+          </a:xfrm>
+        </p:spPr>
+        <p:txBody>
+          <a:bodyPr>
+            <a:normAutofit fontScale="90000"/>
+          </a:bodyPr>
+          <a:lstStyle/>
+          <a:p>
+            <a:r>
+              <a:rPr lang="zh-CN" altLang="en-US" dirty="0"/>
+              <a:t>高</a:t>
+            </a:r>
+            <a:r>
+              <a:rPr lang="zh-CN" altLang="en-US" dirty="0" smtClean="0"/>
+              <a:t>低档分区会形成供需势差</a:t>
+            </a:r>
+            <a:endParaRPr lang="en-US" dirty="0"/>
+          </a:p>
+        </p:txBody>
+      </p:sp>
+      <p:sp>
+        <p:nvSpPr>
+          <p:cNvPr id="13" name="内容占位符 4"/>
+          <p:cNvSpPr>
+            <a:spLocks noGrp="1"/>
+          </p:cNvSpPr>
+          <p:nvPr>
+            <p:ph idx="1"/>
+          </p:nvPr>
+        </p:nvSpPr>
+        <p:spPr>
+          <a:xfrm>
+            <a:off x="838201" y="1165566"/>
+            <a:ext cx="2552700" cy="5011397"/>
+          </a:xfrm>
+        </p:spPr>
         <p:txBody>
           <a:bodyPr>
             <a:normAutofit/>
           </a:bodyPr>
           <a:lstStyle/>
           <a:p>
-            <a:r>
-              <a:rPr lang="en-US" altLang="zh-CN" dirty="0" smtClean="0"/>
-              <a:t>【</a:t>
-            </a:r>
-            <a:r>
-              <a:rPr lang="zh-CN" altLang="en-US" dirty="0" smtClean="0"/>
-              <a:t>模拟过程</a:t>
-            </a:r>
-            <a:r>
-              <a:rPr lang="en-US" altLang="zh-CN" dirty="0" smtClean="0"/>
-              <a:t>】</a:t>
-            </a:r>
-            <a:endParaRPr lang="en-US" dirty="0"/>
-          </a:p>
-        </p:txBody>
-      </p:sp>
-      <p:sp>
-        <p:nvSpPr>
-          <p:cNvPr id="5" name="内容占位符 4"/>
-          <p:cNvSpPr>
-            <a:spLocks noGrp="1"/>
-          </p:cNvSpPr>
-          <p:nvPr>
-            <p:ph idx="1"/>
-          </p:nvPr>
-        </p:nvSpPr>
-        <p:spPr/>
-        <p:txBody>
-          <a:bodyPr>
-            <a:normAutofit/>
-          </a:bodyPr>
-          <a:lstStyle/>
-          <a:p>
-            <a:pPr marL="457200" indent="-457200">
-              <a:buFont typeface="+mj-lt"/>
-              <a:buAutoNum type="arabicPeriod"/>
-            </a:pPr>
-            <a:r>
-              <a:rPr lang="zh-CN" altLang="en-US" dirty="0" smtClean="0"/>
-              <a:t>建模：</a:t>
-            </a:r>
-            <a:endParaRPr lang="en-US" altLang="zh-CN" dirty="0" smtClean="0"/>
-          </a:p>
-          <a:p>
-            <a:pPr marL="914400" lvl="1" indent="-457200">
-              <a:buFont typeface="+mj-lt"/>
-              <a:buAutoNum type="arabicPeriod"/>
-            </a:pPr>
-            <a:r>
-              <a:rPr lang="zh-CN" altLang="en-US" dirty="0" smtClean="0"/>
-              <a:t>空间建模：</a:t>
-            </a:r>
-            <a:endParaRPr lang="en-US" altLang="zh-CN" dirty="0" smtClean="0"/>
-          </a:p>
-          <a:p>
-            <a:pPr lvl="2"/>
-            <a:r>
-              <a:rPr lang="zh-CN" altLang="en-US" dirty="0" smtClean="0"/>
-              <a:t>车位位置、车位尺寸类型的标注；</a:t>
-            </a:r>
-            <a:endParaRPr lang="en-US" altLang="zh-CN" dirty="0" smtClean="0"/>
-          </a:p>
-          <a:p>
-            <a:pPr lvl="2"/>
-            <a:r>
-              <a:rPr lang="zh-CN" altLang="en-US" dirty="0" smtClean="0"/>
-              <a:t>单元楼电梯间</a:t>
-            </a:r>
-            <a:r>
-              <a:rPr lang="zh-CN" altLang="en-US" dirty="0"/>
-              <a:t>标注</a:t>
-            </a:r>
-            <a:r>
-              <a:rPr lang="zh-CN" altLang="en-US" dirty="0" smtClean="0"/>
-              <a:t>；</a:t>
-            </a:r>
-            <a:endParaRPr lang="en-US" altLang="zh-CN" dirty="0" smtClean="0"/>
-          </a:p>
-          <a:p>
-            <a:pPr lvl="2"/>
-            <a:r>
-              <a:rPr lang="zh-CN" altLang="en-US" dirty="0" smtClean="0"/>
-              <a:t>转换电梯位置标注；</a:t>
-            </a:r>
-            <a:endParaRPr lang="en-US" altLang="zh-CN" dirty="0" smtClean="0"/>
-          </a:p>
-          <a:p>
-            <a:pPr lvl="2"/>
-            <a:r>
-              <a:rPr lang="zh-CN" altLang="en-US" dirty="0" smtClean="0"/>
-              <a:t>园区人行出入口位置</a:t>
-            </a:r>
-            <a:r>
-              <a:rPr lang="zh-CN" altLang="en-US" dirty="0"/>
-              <a:t>标注</a:t>
-            </a:r>
-            <a:r>
-              <a:rPr lang="zh-CN" altLang="en-US" dirty="0" smtClean="0"/>
-              <a:t>；</a:t>
-            </a:r>
-            <a:endParaRPr lang="en-US" altLang="zh-CN" dirty="0" smtClean="0"/>
-          </a:p>
-          <a:p>
-            <a:pPr marL="914400" lvl="1" indent="-457200">
-              <a:buFont typeface="+mj-lt"/>
-              <a:buAutoNum type="arabicPeriod"/>
-            </a:pPr>
-            <a:r>
-              <a:rPr lang="zh-CN" altLang="en-US" dirty="0" smtClean="0"/>
-              <a:t>图纸整理：整理成</a:t>
-            </a:r>
-            <a:r>
-              <a:rPr lang="en-US" altLang="zh-CN" dirty="0" smtClean="0"/>
-              <a:t>AI</a:t>
-            </a:r>
-            <a:r>
-              <a:rPr lang="zh-CN" altLang="en-US" dirty="0" smtClean="0"/>
-              <a:t>可以接受的图纸格式，进行编码；</a:t>
-            </a:r>
-            <a:endParaRPr lang="en-US" altLang="zh-CN" dirty="0" smtClean="0"/>
-          </a:p>
-          <a:p>
-            <a:pPr marL="914400" lvl="1" indent="-457200">
-              <a:buFont typeface="+mj-lt"/>
-              <a:buAutoNum type="arabicPeriod"/>
-            </a:pPr>
-            <a:r>
-              <a:rPr lang="zh-CN" altLang="en-US" dirty="0" smtClean="0"/>
-              <a:t>客户建模：</a:t>
-            </a:r>
-            <a:r>
-              <a:rPr lang="zh-CN" altLang="en-US" dirty="0"/>
-              <a:t>通过调研结果和</a:t>
-            </a:r>
-            <a:r>
-              <a:rPr lang="zh-CN" altLang="en-US" dirty="0" smtClean="0"/>
-              <a:t>统计规律给每个单元的每个客户建模；</a:t>
-            </a:r>
-            <a:endParaRPr lang="en-US" altLang="zh-CN" dirty="0" smtClean="0"/>
-          </a:p>
-          <a:p>
-            <a:pPr marL="457200" indent="-457200">
-              <a:buFont typeface="+mj-lt"/>
-              <a:buAutoNum type="arabicPeriod"/>
-            </a:pPr>
-            <a:r>
-              <a:rPr lang="zh-CN" altLang="en-US" dirty="0" smtClean="0"/>
-              <a:t>模拟：</a:t>
-            </a:r>
-            <a:endParaRPr lang="en-US" altLang="zh-CN" dirty="0" smtClean="0"/>
-          </a:p>
-          <a:p>
-            <a:pPr marL="914400" lvl="1" indent="-457200">
-              <a:buFont typeface="+mj-lt"/>
-              <a:buAutoNum type="arabicPeriod"/>
-            </a:pPr>
-            <a:r>
-              <a:rPr lang="zh-CN" altLang="en-US" dirty="0" smtClean="0"/>
-              <a:t>选购多方博弈过程模拟；</a:t>
-            </a:r>
-            <a:endParaRPr lang="en-US" altLang="zh-CN" dirty="0" smtClean="0"/>
-          </a:p>
-          <a:p>
-            <a:pPr marL="914400" lvl="1" indent="-457200">
-              <a:buFont typeface="+mj-lt"/>
-              <a:buAutoNum type="arabicPeriod"/>
-            </a:pPr>
-            <a:r>
-              <a:rPr lang="zh-CN" altLang="en-US" dirty="0" smtClean="0"/>
-              <a:t>分期，销控手段的模拟；出售比例要求，这些都影响定价策略；</a:t>
-            </a:r>
-            <a:endParaRPr lang="en-US" altLang="zh-CN" dirty="0"/>
-          </a:p>
-          <a:p>
-            <a:pPr marL="914400" lvl="1" indent="-457200">
-              <a:buFont typeface="+mj-lt"/>
-              <a:buAutoNum type="arabicPeriod"/>
-            </a:pPr>
-            <a:r>
-              <a:rPr lang="zh-CN" altLang="en-US" dirty="0" smtClean="0"/>
-              <a:t>考虑客户感受，风险管控，避免各期价格过大波动。</a:t>
-            </a:r>
-            <a:endParaRPr lang="en-US" altLang="zh-CN" dirty="0" smtClean="0"/>
-          </a:p>
-          <a:p>
-            <a:pPr marL="457200" indent="-457200">
-              <a:buFont typeface="+mj-lt"/>
-              <a:buAutoNum type="arabicPeriod"/>
-            </a:pPr>
-            <a:r>
-              <a:rPr lang="zh-CN" altLang="en-US" dirty="0" smtClean="0"/>
-              <a:t>检查模型和项目现实匹配度，并调整参数。</a:t>
-            </a:r>
-            <a:endParaRPr lang="en-US" altLang="zh-CN" dirty="0" smtClean="0"/>
-          </a:p>
-          <a:p>
             <a:pPr marL="0" indent="0">
               <a:buNone/>
             </a:pPr>
-            <a:endParaRPr lang="en-US" altLang="zh-CN" dirty="0" smtClean="0"/>
+            <a:r>
+              <a:rPr lang="zh-CN" altLang="en-US" sz="2000" dirty="0" smtClean="0"/>
+              <a:t>改善区域客户对车位的价格</a:t>
+            </a:r>
+            <a:endParaRPr lang="en-US" altLang="zh-CN" sz="2000" dirty="0" smtClean="0"/>
           </a:p>
         </p:txBody>
       </p:sp>
     </p:spTree>
     <p:extLst>
       <p:ext uri="{BB962C8B-B14F-4D97-AF65-F5344CB8AC3E}">
-        <p14:creationId xmlns:p14="http://schemas.microsoft.com/office/powerpoint/2010/main" val="311261492"/>
+        <p14:creationId xmlns:p14="http://schemas.microsoft.com/office/powerpoint/2010/main" val="1215392372"/>
       </p:ext>
     </p:extLst>
   </p:cSld>
@@ -5124,254 +5383,260 @@
           <a:chExt cx="0" cy="0"/>
         </a:xfrm>
       </p:grpSpPr>
-      <p:sp>
-        <p:nvSpPr>
-          <p:cNvPr id="4" name="标题 3"/>
-          <p:cNvSpPr>
-            <a:spLocks noGrp="1"/>
-          </p:cNvSpPr>
-          <p:nvPr>
-            <p:ph type="title"/>
-          </p:nvPr>
-        </p:nvSpPr>
-        <p:spPr/>
-        <p:txBody>
-          <a:bodyPr>
-            <a:normAutofit/>
-          </a:bodyPr>
-          <a:lstStyle/>
-          <a:p>
-            <a:r>
-              <a:rPr lang="en-US" altLang="zh-CN" dirty="0" smtClean="0"/>
-              <a:t>【</a:t>
-            </a:r>
-            <a:r>
-              <a:rPr lang="zh-CN" altLang="en-US" dirty="0" smtClean="0"/>
-              <a:t>输出内容</a:t>
-            </a:r>
-            <a:r>
-              <a:rPr lang="en-US" altLang="zh-CN" dirty="0" smtClean="0"/>
-              <a:t>】</a:t>
-            </a:r>
-            <a:endParaRPr lang="en-US" dirty="0"/>
-          </a:p>
-        </p:txBody>
-      </p:sp>
-      <p:sp>
-        <p:nvSpPr>
-          <p:cNvPr id="5" name="内容占位符 4"/>
-          <p:cNvSpPr>
-            <a:spLocks noGrp="1"/>
-          </p:cNvSpPr>
-          <p:nvPr>
-            <p:ph idx="1"/>
-          </p:nvPr>
-        </p:nvSpPr>
-        <p:spPr/>
-        <p:txBody>
-          <a:bodyPr/>
-          <a:lstStyle/>
-          <a:p>
-            <a:pPr marL="457200" indent="-457200">
-              <a:buFont typeface="+mj-lt"/>
-              <a:buAutoNum type="arabicPeriod"/>
-            </a:pPr>
-            <a:r>
-              <a:rPr lang="zh-CN" altLang="en-US" dirty="0" smtClean="0"/>
-              <a:t>不同目标下的定价策略</a:t>
-            </a:r>
-            <a:endParaRPr lang="en-US" altLang="zh-CN" dirty="0" smtClean="0"/>
-          </a:p>
-          <a:p>
-            <a:pPr marL="914400" lvl="1" indent="-457200">
-              <a:buFont typeface="+mj-lt"/>
-              <a:buAutoNum type="arabicPeriod"/>
-            </a:pPr>
-            <a:r>
-              <a:rPr lang="zh-CN" altLang="en-US" dirty="0" smtClean="0"/>
-              <a:t>利润目标；</a:t>
-            </a:r>
-            <a:endParaRPr lang="en-US" altLang="zh-CN" dirty="0" smtClean="0"/>
-          </a:p>
-          <a:p>
-            <a:pPr marL="914400" lvl="1" indent="-457200">
-              <a:buFont typeface="+mj-lt"/>
-              <a:buAutoNum type="arabicPeriod"/>
-            </a:pPr>
-            <a:r>
-              <a:rPr lang="zh-CN" altLang="en-US" dirty="0"/>
-              <a:t>一次性</a:t>
-            </a:r>
-            <a:r>
-              <a:rPr lang="zh-CN" altLang="en-US" dirty="0" smtClean="0"/>
-              <a:t>现金流目标；</a:t>
-            </a:r>
-            <a:endParaRPr lang="en-US" altLang="zh-CN" dirty="0" smtClean="0"/>
-          </a:p>
-          <a:p>
-            <a:pPr marL="914400" lvl="1" indent="-457200">
-              <a:buFont typeface="+mj-lt"/>
-              <a:buAutoNum type="arabicPeriod"/>
-            </a:pPr>
-            <a:r>
-              <a:rPr lang="zh-CN" altLang="en-US" dirty="0" smtClean="0"/>
-              <a:t>折中目标等。</a:t>
-            </a:r>
-            <a:endParaRPr lang="en-US" altLang="zh-CN" dirty="0" smtClean="0"/>
-          </a:p>
-          <a:p>
-            <a:pPr marL="457200" indent="-457200">
-              <a:buFont typeface="+mj-lt"/>
-              <a:buAutoNum type="arabicPeriod"/>
-            </a:pPr>
-            <a:r>
-              <a:rPr lang="zh-CN" altLang="en-US" dirty="0" smtClean="0"/>
-              <a:t>最优定价方案；</a:t>
-            </a:r>
-            <a:endParaRPr lang="en-US" altLang="zh-CN" dirty="0" smtClean="0"/>
-          </a:p>
-          <a:p>
-            <a:pPr lvl="1">
-              <a:buFont typeface="+mj-lt"/>
-              <a:buAutoNum type="arabicPeriod"/>
-            </a:pPr>
-            <a:r>
-              <a:rPr lang="zh-CN" altLang="en-US" dirty="0" smtClean="0"/>
-              <a:t>每个车位在特定时点销售的合理价格；</a:t>
-            </a:r>
-            <a:endParaRPr lang="en-US" altLang="zh-CN" dirty="0" smtClean="0"/>
-          </a:p>
-          <a:p>
-            <a:pPr marL="457200" indent="-457200">
-              <a:buFont typeface="+mj-lt"/>
-              <a:buAutoNum type="arabicPeriod"/>
-            </a:pPr>
-            <a:r>
-              <a:rPr lang="zh-CN" altLang="en-US" dirty="0" smtClean="0"/>
-              <a:t>销控方案：</a:t>
-            </a:r>
-            <a:endParaRPr lang="en-US" altLang="zh-CN" dirty="0" smtClean="0"/>
-          </a:p>
-          <a:p>
-            <a:pPr marL="914400" lvl="1" indent="-457200">
-              <a:buFont typeface="+mj-lt"/>
-              <a:buAutoNum type="arabicPeriod"/>
-            </a:pPr>
-            <a:r>
-              <a:rPr lang="zh-CN" altLang="en-US" dirty="0" smtClean="0"/>
-              <a:t>保持供求关系正常，避免影响后续其他楼栋；</a:t>
-            </a:r>
-            <a:endParaRPr lang="en-US" altLang="zh-CN" dirty="0" smtClean="0"/>
-          </a:p>
-          <a:p>
-            <a:pPr marL="457200" indent="-457200"/>
-            <a:r>
-              <a:rPr lang="zh-CN" altLang="en-US" dirty="0" smtClean="0"/>
-              <a:t>特殊车位定价：</a:t>
-            </a:r>
-            <a:endParaRPr lang="en-US" altLang="zh-CN" dirty="0" smtClean="0"/>
-          </a:p>
-          <a:p>
-            <a:pPr marL="914400" lvl="1" indent="-457200"/>
-            <a:r>
-              <a:rPr lang="zh-CN" altLang="en-US" dirty="0"/>
-              <a:t>小</a:t>
-            </a:r>
-            <a:r>
-              <a:rPr lang="zh-CN" altLang="en-US" dirty="0" smtClean="0"/>
-              <a:t>车位、子母车位、</a:t>
-            </a:r>
-            <a:r>
-              <a:rPr lang="en-US" altLang="zh-CN" dirty="0" smtClean="0"/>
-              <a:t>VIP</a:t>
-            </a:r>
-            <a:r>
-              <a:rPr lang="zh-CN" altLang="en-US" dirty="0" smtClean="0"/>
-              <a:t>车位等按照各自逻辑定价。</a:t>
-            </a:r>
-            <a:endParaRPr lang="en-US" altLang="zh-CN" dirty="0" smtClean="0"/>
-          </a:p>
-        </p:txBody>
-      </p:sp>
       <p:pic>
         <p:nvPicPr>
-          <p:cNvPr id="6" name="图片 5"/>
+          <p:cNvPr id="2" name="图片 1"/>
           <p:cNvPicPr>
             <a:picLocks noChangeAspect="1"/>
           </p:cNvPicPr>
           <p:nvPr/>
         </p:nvPicPr>
         <p:blipFill rotWithShape="1">
-          <a:blip r:embed="rId2" cstate="print">
+          <a:blip r:embed="rId3" cstate="print">
             <a:extLst>
               <a:ext uri="{28A0092B-C50C-407E-A947-70E740481C1C}">
                 <a14:useLocalDpi xmlns:a14="http://schemas.microsoft.com/office/drawing/2010/main" val="0"/>
               </a:ext>
             </a:extLst>
           </a:blip>
-          <a:srcRect r="59289" b="55650"/>
+          <a:srcRect l="14869" t="1976" r="57446" b="68591"/>
           <a:stretch/>
         </p:blipFill>
         <p:spPr>
           <a:xfrm>
-            <a:off x="7578090" y="365125"/>
-            <a:ext cx="4001226" cy="5811837"/>
+            <a:off x="338137" y="2043699"/>
+            <a:ext cx="5572126" cy="3949297"/>
           </a:xfrm>
           <a:prstGeom prst="rect">
             <a:avLst/>
           </a:prstGeom>
         </p:spPr>
       </p:pic>
-      <p:sp>
-        <p:nvSpPr>
-          <p:cNvPr id="2" name="矩形 1"/>
-          <p:cNvSpPr/>
+      <p:grpSp>
+        <p:nvGrpSpPr>
+          <p:cNvPr id="7" name="组合 6"/>
+          <p:cNvGrpSpPr/>
           <p:nvPr/>
-        </p:nvSpPr>
-        <p:spPr>
-          <a:xfrm>
-            <a:off x="7482840" y="269875"/>
-            <a:ext cx="1870710" cy="2540000"/>
+        </p:nvGrpSpPr>
+        <p:grpSpPr>
+          <a:xfrm>
+            <a:off x="462440" y="4642072"/>
+            <a:ext cx="751520" cy="1244244"/>
+            <a:chOff x="2746410" y="1549395"/>
+            <a:chExt cx="751520" cy="1244244"/>
+          </a:xfrm>
+        </p:grpSpPr>
+        <p:sp>
+          <p:nvSpPr>
+            <p:cNvPr id="8" name="矩形 7"/>
+            <p:cNvSpPr/>
+            <p:nvPr/>
+          </p:nvSpPr>
+          <p:spPr>
+            <a:xfrm>
+              <a:off x="2746410" y="1631097"/>
+              <a:ext cx="137160" cy="1104900"/>
+            </a:xfrm>
+            <a:prstGeom prst="rect">
+              <a:avLst/>
+            </a:prstGeom>
+            <a:gradFill>
+              <a:gsLst>
+                <a:gs pos="0">
+                  <a:srgbClr val="FF0000"/>
+                </a:gs>
+                <a:gs pos="100000">
+                  <a:srgbClr val="002060"/>
+                </a:gs>
+              </a:gsLst>
+              <a:lin ang="5400000" scaled="1"/>
+            </a:gradFill>
+            <a:ln>
+              <a:noFill/>
+            </a:ln>
+          </p:spPr>
+          <p:style>
+            <a:lnRef idx="2">
+              <a:schemeClr val="accent1">
+                <a:shade val="50000"/>
+              </a:schemeClr>
+            </a:lnRef>
+            <a:fillRef idx="1">
+              <a:schemeClr val="accent1"/>
+            </a:fillRef>
+            <a:effectRef idx="0">
+              <a:schemeClr val="accent1"/>
+            </a:effectRef>
+            <a:fontRef idx="minor">
+              <a:schemeClr val="lt1"/>
+            </a:fontRef>
+          </p:style>
+          <p:txBody>
+            <a:bodyPr rtlCol="0" anchor="ctr"/>
+            <a:lstStyle/>
+            <a:p>
+              <a:pPr algn="ctr"/>
+              <a:endParaRPr lang="en-US"/>
+            </a:p>
+          </p:txBody>
+        </p:sp>
+        <p:sp>
+          <p:nvSpPr>
+            <p:cNvPr id="9" name="矩形 8"/>
+            <p:cNvSpPr/>
+            <p:nvPr/>
+          </p:nvSpPr>
+          <p:spPr>
+            <a:xfrm>
+              <a:off x="2890071" y="1549395"/>
+              <a:ext cx="607859" cy="261610"/>
+            </a:xfrm>
+            <a:prstGeom prst="rect">
+              <a:avLst/>
+            </a:prstGeom>
+          </p:spPr>
+          <p:txBody>
+            <a:bodyPr wrap="none">
+              <a:spAutoFit/>
+            </a:bodyPr>
+            <a:lstStyle/>
+            <a:p>
+              <a:pPr algn="r"/>
+              <a:r>
+                <a:rPr lang="zh-CN" altLang="en-US" sz="1050" dirty="0" smtClean="0"/>
+                <a:t>价格高</a:t>
+              </a:r>
+              <a:endParaRPr lang="en-US" sz="1050" dirty="0"/>
+            </a:p>
+          </p:txBody>
+        </p:sp>
+        <p:sp>
+          <p:nvSpPr>
+            <p:cNvPr id="10" name="矩形 9"/>
+            <p:cNvSpPr/>
+            <p:nvPr/>
+          </p:nvSpPr>
+          <p:spPr>
+            <a:xfrm>
+              <a:off x="2894299" y="2539723"/>
+              <a:ext cx="588624" cy="253916"/>
+            </a:xfrm>
+            <a:prstGeom prst="rect">
+              <a:avLst/>
+            </a:prstGeom>
+          </p:spPr>
+          <p:txBody>
+            <a:bodyPr wrap="none">
+              <a:spAutoFit/>
+            </a:bodyPr>
+            <a:lstStyle/>
+            <a:p>
+              <a:pPr algn="r"/>
+              <a:r>
+                <a:rPr lang="zh-CN" altLang="en-US" sz="1050" dirty="0" smtClean="0"/>
+                <a:t>价格低</a:t>
+              </a:r>
+              <a:endParaRPr lang="en-US" sz="1050" dirty="0"/>
+            </a:p>
+          </p:txBody>
+        </p:sp>
+      </p:grpSp>
+      <p:sp>
+        <p:nvSpPr>
+          <p:cNvPr id="14" name="标题 13"/>
+          <p:cNvSpPr>
+            <a:spLocks noGrp="1"/>
+          </p:cNvSpPr>
+          <p:nvPr>
+            <p:ph type="title"/>
+          </p:nvPr>
+        </p:nvSpPr>
+        <p:spPr>
+          <a:xfrm>
+            <a:off x="838200" y="365126"/>
+            <a:ext cx="4541520" cy="623839"/>
+          </a:xfrm>
+        </p:spPr>
+        <p:txBody>
+          <a:bodyPr>
+            <a:normAutofit fontScale="90000"/>
+          </a:bodyPr>
+          <a:lstStyle/>
+          <a:p>
+            <a:r>
+              <a:rPr lang="zh-CN" altLang="en-US" dirty="0"/>
+              <a:t>改善区域客户对车位的价格看法和首置客户的差异：</a:t>
+            </a:r>
+            <a:endParaRPr lang="en-US" altLang="zh-CN" dirty="0"/>
+          </a:p>
+        </p:txBody>
+      </p:sp>
+      <p:sp>
+        <p:nvSpPr>
+          <p:cNvPr id="13" name="内容占位符 4"/>
+          <p:cNvSpPr>
+            <a:spLocks noGrp="1"/>
+          </p:cNvSpPr>
+          <p:nvPr>
+            <p:ph idx="1"/>
+          </p:nvPr>
+        </p:nvSpPr>
+        <p:spPr>
+          <a:xfrm>
+            <a:off x="462440" y="1196047"/>
+            <a:ext cx="8780620" cy="792774"/>
+          </a:xfrm>
+        </p:spPr>
+        <p:txBody>
+          <a:bodyPr>
+            <a:normAutofit/>
+          </a:bodyPr>
+          <a:lstStyle/>
+          <a:p>
+            <a:pPr marL="0" indent="0">
+              <a:buNone/>
+            </a:pPr>
+            <a:r>
+              <a:rPr lang="zh-CN" altLang="en-US" sz="2000" dirty="0" smtClean="0"/>
+              <a:t>改善客户对小车位、不利车位更敏感；首置客户微型车使用比例高，可以更好的消化小车位和不利车位。</a:t>
+            </a:r>
+            <a:endParaRPr lang="en-US" altLang="zh-CN" sz="2000" dirty="0" smtClean="0"/>
+          </a:p>
+        </p:txBody>
+      </p:sp>
+      <p:pic>
+        <p:nvPicPr>
+          <p:cNvPr id="15" name="图片 14"/>
+          <p:cNvPicPr>
+            <a:picLocks noChangeAspect="1"/>
+          </p:cNvPicPr>
+          <p:nvPr/>
+        </p:nvPicPr>
+        <p:blipFill rotWithShape="1">
+          <a:blip r:embed="rId3" cstate="print">
+            <a:extLst>
+              <a:ext uri="{28A0092B-C50C-407E-A947-70E740481C1C}">
+                <a14:useLocalDpi xmlns:a14="http://schemas.microsoft.com/office/drawing/2010/main" val="0"/>
+              </a:ext>
+            </a:extLst>
+          </a:blip>
+          <a:srcRect l="52303" t="54932" r="20012" b="15635"/>
+          <a:stretch/>
+        </p:blipFill>
+        <p:spPr>
+          <a:xfrm>
+            <a:off x="6148387" y="2043698"/>
+            <a:ext cx="5572126" cy="3949297"/>
           </a:xfrm>
           <a:prstGeom prst="rect">
             <a:avLst/>
           </a:prstGeom>
-          <a:noFill/>
-          <a:ln>
-            <a:solidFill>
-              <a:srgbClr val="FF0000"/>
-            </a:solidFill>
-          </a:ln>
-        </p:spPr>
-        <p:style>
-          <a:lnRef idx="2">
-            <a:schemeClr val="accent1">
-              <a:shade val="50000"/>
-            </a:schemeClr>
-          </a:lnRef>
-          <a:fillRef idx="1">
-            <a:schemeClr val="accent1"/>
-          </a:fillRef>
-          <a:effectRef idx="0">
-            <a:schemeClr val="accent1"/>
-          </a:effectRef>
-          <a:fontRef idx="minor">
-            <a:schemeClr val="lt1"/>
-          </a:fontRef>
-        </p:style>
-        <p:txBody>
-          <a:bodyPr rtlCol="0" anchor="ctr"/>
-          <a:lstStyle/>
-          <a:p>
-            <a:pPr algn="ctr"/>
-            <a:endParaRPr lang="en-US"/>
-          </a:p>
-        </p:txBody>
-      </p:sp>
+        </p:spPr>
+      </p:pic>
     </p:spTree>
     <p:extLst>
       <p:ext uri="{BB962C8B-B14F-4D97-AF65-F5344CB8AC3E}">
-        <p14:creationId xmlns:p14="http://schemas.microsoft.com/office/powerpoint/2010/main" val="2104735274"/>
+        <p14:creationId xmlns:p14="http://schemas.microsoft.com/office/powerpoint/2010/main" val="3481395834"/>
       </p:ext>
     </p:extLst>
   </p:cSld>
@@ -5407,7 +5672,7 @@
       </p:grpSpPr>
       <p:sp>
         <p:nvSpPr>
-          <p:cNvPr id="2" name="标题 1"/>
+          <p:cNvPr id="4" name="标题 3"/>
           <p:cNvSpPr>
             <a:spLocks noGrp="1"/>
           </p:cNvSpPr>
@@ -5417,12 +5682,22 @@
         </p:nvSpPr>
         <p:spPr/>
         <p:txBody>
-          <a:bodyPr/>
-          <a:lstStyle/>
-          <a:p>
-            <a:r>
-              <a:rPr lang="zh-CN" altLang="en-US" dirty="0" smtClean="0"/>
-              <a:t>案例应用</a:t>
+          <a:bodyPr>
+            <a:normAutofit/>
+          </a:bodyPr>
+          <a:lstStyle/>
+          <a:p>
+            <a:r>
+              <a:rPr lang="en-US" altLang="zh-CN" dirty="0" smtClean="0"/>
+              <a:t>【</a:t>
+            </a:r>
+            <a:r>
+              <a:rPr lang="zh-CN" altLang="en-US" dirty="0" smtClean="0"/>
+              <a:t>模拟过程</a:t>
+            </a:r>
+            <a:r>
+              <a:rPr lang="en-US" altLang="zh-CN" dirty="0" smtClean="0"/>
+              <a:t>】</a:t>
             </a:r>
             <a:endParaRPr lang="en-US" dirty="0"/>
           </a:p>
@@ -5430,7 +5705,7 @@
       </p:sp>
       <p:sp>
         <p:nvSpPr>
-          <p:cNvPr id="3" name="内容占位符 2"/>
+          <p:cNvPr id="5" name="内容占位符 4"/>
           <p:cNvSpPr>
             <a:spLocks noGrp="1"/>
           </p:cNvSpPr>
@@ -5440,217 +5715,185 @@
         </p:nvSpPr>
         <p:spPr/>
         <p:txBody>
-          <a:bodyPr/>
-          <a:lstStyle/>
-          <a:p>
+          <a:bodyPr>
+            <a:normAutofit/>
+          </a:bodyPr>
+          <a:lstStyle/>
+          <a:p>
+            <a:pPr marL="457200" indent="-457200">
+              <a:buFont typeface="+mj-lt"/>
+              <a:buAutoNum type="arabicPeriod"/>
+            </a:pPr>
+            <a:r>
+              <a:rPr lang="zh-CN" altLang="en-US" dirty="0" smtClean="0"/>
+              <a:t>建模：</a:t>
+            </a:r>
+            <a:endParaRPr lang="en-US" altLang="zh-CN" dirty="0" smtClean="0"/>
+          </a:p>
+          <a:p>
+            <a:pPr marL="914400" lvl="1" indent="-457200">
+              <a:buFont typeface="+mj-lt"/>
+              <a:buAutoNum type="arabicPeriod"/>
+            </a:pPr>
+            <a:r>
+              <a:rPr lang="zh-CN" altLang="en-US" dirty="0" smtClean="0"/>
+              <a:t>空间建模：</a:t>
+            </a:r>
+            <a:endParaRPr lang="en-US" altLang="zh-CN" dirty="0" smtClean="0"/>
+          </a:p>
+          <a:p>
+            <a:pPr lvl="2"/>
+            <a:r>
+              <a:rPr lang="zh-CN" altLang="en-US" dirty="0" smtClean="0"/>
+              <a:t>车位位置、车位尺寸类型的标注；</a:t>
+            </a:r>
+            <a:endParaRPr lang="en-US" altLang="zh-CN" dirty="0" smtClean="0"/>
+          </a:p>
+          <a:p>
+            <a:pPr lvl="2"/>
+            <a:r>
+              <a:rPr lang="zh-CN" altLang="en-US" dirty="0" smtClean="0"/>
+              <a:t>单元楼电梯间</a:t>
+            </a:r>
             <a:r>
               <a:rPr lang="zh-CN" altLang="en-US" dirty="0"/>
-              <a:t>车位定价、分期、模拟选车系统。能把局部的供求关系表现得很细，便宜的区域就是周边客户少车位多得地方。用雪山万科城</a:t>
-            </a:r>
-            <a:r>
-              <a:rPr lang="en-US" altLang="zh-CN" dirty="0"/>
-              <a:t>A6</a:t>
+              <a:t>标注</a:t>
+            </a:r>
+            <a:r>
+              <a:rPr lang="zh-CN" altLang="en-US" dirty="0" smtClean="0"/>
+              <a:t>；</a:t>
+            </a:r>
+            <a:endParaRPr lang="en-US" altLang="zh-CN" dirty="0" smtClean="0"/>
+          </a:p>
+          <a:p>
+            <a:pPr lvl="2"/>
+            <a:r>
+              <a:rPr lang="zh-CN" altLang="en-US" dirty="0" smtClean="0"/>
+              <a:t>转换电梯位置标注；</a:t>
+            </a:r>
+            <a:endParaRPr lang="en-US" altLang="zh-CN" dirty="0" smtClean="0"/>
+          </a:p>
+          <a:p>
+            <a:pPr lvl="2"/>
+            <a:r>
+              <a:rPr lang="zh-CN" altLang="en-US" dirty="0" smtClean="0"/>
+              <a:t>园区人行出入口位置</a:t>
             </a:r>
             <a:r>
               <a:rPr lang="zh-CN" altLang="en-US" dirty="0"/>
-              <a:t>做的模拟。根据客户行为。模拟结果</a:t>
-            </a:r>
-            <a:r>
-              <a:rPr lang="zh-CN" altLang="en-US" dirty="0" smtClean="0"/>
-              <a:t>：</a:t>
+              <a:t>标注</a:t>
+            </a:r>
+            <a:r>
+              <a:rPr lang="zh-CN" altLang="en-US" dirty="0" smtClean="0"/>
+              <a:t>；</a:t>
             </a:r>
             <a:endParaRPr lang="en-US" altLang="zh-CN" dirty="0" smtClean="0"/>
           </a:p>
           <a:p>
-            <a:pPr lvl="1">
-              <a:buFont typeface="Arial" panose="020B0604020202020204" pitchFamily="34" charset="0"/>
-              <a:buChar char="•"/>
+            <a:pPr marL="914400" lvl="1" indent="-457200">
+              <a:buFont typeface="+mj-lt"/>
+              <a:buAutoNum type="arabicPeriod"/>
             </a:pPr>
             <a:r>
               <a:rPr lang="zh-CN" altLang="en-US" dirty="0" smtClean="0"/>
-              <a:t>总</a:t>
+              <a:t>图纸整理：整理成</a:t>
+            </a:r>
+            <a:r>
+              <a:rPr lang="en-US" altLang="zh-CN" dirty="0" smtClean="0"/>
+              <a:t>AI</a:t>
+            </a:r>
+            <a:r>
+              <a:rPr lang="zh-CN" altLang="en-US" dirty="0" smtClean="0"/>
+              <a:t>可以接受的图纸格式，进行编码；</a:t>
+            </a:r>
+            <a:endParaRPr lang="en-US" altLang="zh-CN" dirty="0" smtClean="0"/>
+          </a:p>
+          <a:p>
+            <a:pPr marL="914400" lvl="1" indent="-457200">
+              <a:buFont typeface="+mj-lt"/>
+              <a:buAutoNum type="arabicPeriod"/>
+            </a:pPr>
+            <a:r>
+              <a:rPr lang="zh-CN" altLang="en-US" dirty="0" smtClean="0"/>
+              <a:t>客户建模：</a:t>
             </a:r>
             <a:r>
               <a:rPr lang="zh-CN" altLang="en-US" dirty="0"/>
-              <a:t>车位数 </a:t>
-            </a:r>
-            <a:r>
-              <a:rPr lang="en-US" altLang="zh-CN" dirty="0"/>
-              <a:t>: </a:t>
-            </a:r>
-            <a:r>
-              <a:rPr lang="en-US" altLang="zh-CN" dirty="0" smtClean="0"/>
-              <a:t>1460</a:t>
-            </a:r>
-            <a:r>
-              <a:rPr lang="zh-CN" altLang="en-US" dirty="0" smtClean="0"/>
-              <a:t>；</a:t>
+              <a:t>通过调研结果和</a:t>
+            </a:r>
+            <a:r>
+              <a:rPr lang="zh-CN" altLang="en-US" dirty="0" smtClean="0"/>
+              <a:t>统计规律给每个单元的每个客户建模；</a:t>
             </a:r>
             <a:endParaRPr lang="en-US" altLang="zh-CN" dirty="0" smtClean="0"/>
           </a:p>
           <a:p>
-            <a:pPr lvl="1">
-              <a:buFont typeface="Arial" panose="020B0604020202020204" pitchFamily="34" charset="0"/>
-              <a:buChar char="•"/>
+            <a:pPr marL="457200" indent="-457200">
+              <a:buFont typeface="+mj-lt"/>
+              <a:buAutoNum type="arabicPeriod"/>
             </a:pPr>
             <a:r>
               <a:rPr lang="zh-CN" altLang="en-US" dirty="0" smtClean="0"/>
-              <a:t>总</a:t>
-            </a:r>
-            <a:r>
-              <a:rPr lang="zh-CN" altLang="en-US" dirty="0"/>
-              <a:t>户数 </a:t>
-            </a:r>
-            <a:r>
-              <a:rPr lang="en-US" altLang="zh-CN" dirty="0"/>
-              <a:t>: </a:t>
-            </a:r>
-            <a:r>
-              <a:rPr lang="en-US" altLang="zh-CN" dirty="0" smtClean="0"/>
-              <a:t>1296</a:t>
-            </a:r>
-            <a:r>
-              <a:rPr lang="zh-CN" altLang="en-US" dirty="0" smtClean="0"/>
-              <a:t>；</a:t>
+              <a:t>模拟：</a:t>
             </a:r>
             <a:endParaRPr lang="en-US" altLang="zh-CN" dirty="0" smtClean="0"/>
           </a:p>
           <a:p>
-            <a:pPr lvl="1">
-              <a:buFont typeface="Arial" panose="020B0604020202020204" pitchFamily="34" charset="0"/>
-              <a:buChar char="•"/>
+            <a:pPr marL="914400" lvl="1" indent="-457200">
+              <a:buFont typeface="+mj-lt"/>
+              <a:buAutoNum type="arabicPeriod"/>
             </a:pPr>
             <a:r>
               <a:rPr lang="zh-CN" altLang="en-US" dirty="0" smtClean="0"/>
-              <a:t>总</a:t>
-            </a:r>
-            <a:r>
-              <a:rPr lang="zh-CN" altLang="en-US" dirty="0"/>
-              <a:t>售出车位数 </a:t>
-            </a:r>
-            <a:r>
-              <a:rPr lang="en-US" altLang="zh-CN" dirty="0"/>
-              <a:t>: </a:t>
-            </a:r>
-            <a:r>
-              <a:rPr lang="en-US" altLang="zh-CN" dirty="0" smtClean="0"/>
-              <a:t>1136</a:t>
-            </a:r>
-            <a:r>
-              <a:rPr lang="zh-CN" altLang="en-US" dirty="0" smtClean="0"/>
-              <a:t>；</a:t>
+              <a:t>选购多方博弈过程模拟；</a:t>
             </a:r>
             <a:endParaRPr lang="en-US" altLang="zh-CN" dirty="0" smtClean="0"/>
           </a:p>
           <a:p>
-            <a:pPr lvl="1">
-              <a:buFont typeface="Arial" panose="020B0604020202020204" pitchFamily="34" charset="0"/>
-              <a:buChar char="•"/>
+            <a:pPr marL="914400" lvl="1" indent="-457200">
+              <a:buFont typeface="+mj-lt"/>
+              <a:buAutoNum type="arabicPeriod"/>
             </a:pPr>
             <a:r>
               <a:rPr lang="zh-CN" altLang="en-US" dirty="0" smtClean="0"/>
-              <a:t>车位</a:t>
-            </a:r>
-            <a:r>
-              <a:rPr lang="zh-CN" altLang="en-US" dirty="0"/>
-              <a:t>去化</a:t>
-            </a:r>
-            <a:r>
-              <a:rPr lang="zh-CN" altLang="en-US" dirty="0" smtClean="0"/>
-              <a:t>率 </a:t>
-            </a:r>
-            <a:r>
-              <a:rPr lang="en-US" altLang="zh-CN" dirty="0"/>
-              <a:t>: 78</a:t>
-            </a:r>
-            <a:r>
-              <a:rPr lang="en-US" altLang="zh-CN" dirty="0" smtClean="0"/>
-              <a:t>%</a:t>
-            </a:r>
-          </a:p>
-          <a:p>
-            <a:pPr lvl="1">
-              <a:buFont typeface="Arial" panose="020B0604020202020204" pitchFamily="34" charset="0"/>
-              <a:buChar char="•"/>
+              <a:t>分期，销控手段的模拟；出售比例要求，这些都影响定价策略；</a:t>
+            </a:r>
+            <a:endParaRPr lang="en-US" altLang="zh-CN" dirty="0"/>
+          </a:p>
+          <a:p>
+            <a:pPr marL="914400" lvl="1" indent="-457200">
+              <a:buFont typeface="+mj-lt"/>
+              <a:buAutoNum type="arabicPeriod"/>
             </a:pPr>
             <a:r>
               <a:rPr lang="zh-CN" altLang="en-US" dirty="0" smtClean="0"/>
-              <a:t>总</a:t>
-            </a:r>
-            <a:r>
-              <a:rPr lang="zh-CN" altLang="en-US" dirty="0"/>
-              <a:t>销售额 </a:t>
-            </a:r>
-            <a:r>
-              <a:rPr lang="en-US" altLang="zh-CN" dirty="0"/>
-              <a:t>: 12770</a:t>
-            </a:r>
-            <a:r>
-              <a:rPr lang="zh-CN" altLang="en-US" dirty="0"/>
-              <a:t>万</a:t>
-            </a:r>
-            <a:r>
-              <a:rPr lang="zh-CN" altLang="en-US" dirty="0" smtClean="0"/>
-              <a:t>元；</a:t>
+              <a:t>考虑客户感受，风险管控，避免各期价格过大波动。</a:t>
             </a:r>
             <a:endParaRPr lang="en-US" altLang="zh-CN" dirty="0" smtClean="0"/>
           </a:p>
           <a:p>
-            <a:pPr lvl="1">
-              <a:buFont typeface="Arial" panose="020B0604020202020204" pitchFamily="34" charset="0"/>
-              <a:buChar char="•"/>
+            <a:pPr marL="457200" indent="-457200">
+              <a:buFont typeface="+mj-lt"/>
+              <a:buAutoNum type="arabicPeriod"/>
             </a:pPr>
             <a:r>
               <a:rPr lang="zh-CN" altLang="en-US" dirty="0" smtClean="0"/>
-              <a:t>单车</a:t>
-            </a:r>
-            <a:r>
-              <a:rPr lang="zh-CN" altLang="en-US" dirty="0"/>
-              <a:t>位实现价格 </a:t>
-            </a:r>
-            <a:r>
-              <a:rPr lang="en-US" altLang="zh-CN" dirty="0"/>
-              <a:t>: 11.2</a:t>
-            </a:r>
-            <a:r>
-              <a:rPr lang="zh-CN" altLang="en-US" dirty="0"/>
-              <a:t>万</a:t>
-            </a:r>
-            <a:r>
-              <a:rPr lang="zh-CN" altLang="en-US" dirty="0" smtClean="0"/>
-              <a:t>元；</a:t>
+              <a:t>检查模型和项目现实匹配度，并调整参数。</a:t>
             </a:r>
             <a:endParaRPr lang="en-US" altLang="zh-CN" dirty="0" smtClean="0"/>
           </a:p>
           <a:p>
-            <a:pPr lvl="1">
-              <a:buFont typeface="Arial" panose="020B0604020202020204" pitchFamily="34" charset="0"/>
-              <a:buChar char="•"/>
+            <a:pPr marL="0" indent="0">
+              <a:buNone/>
             </a:pPr>
-            <a:r>
-              <a:rPr lang="zh-CN" altLang="en-US" dirty="0" smtClean="0"/>
-              <a:t>客户</a:t>
-            </a:r>
-            <a:r>
-              <a:rPr lang="zh-CN" altLang="en-US" dirty="0"/>
-              <a:t>需求车位总数</a:t>
-            </a:r>
-            <a:r>
-              <a:rPr lang="en-US" altLang="zh-CN" dirty="0" smtClean="0"/>
-              <a:t>1257</a:t>
-            </a:r>
-            <a:r>
-              <a:rPr lang="zh-CN" altLang="en-US" dirty="0" smtClean="0"/>
-              <a:t>。</a:t>
-            </a:r>
-            <a:endParaRPr lang="en-US" dirty="0"/>
+            <a:endParaRPr lang="en-US" altLang="zh-CN" dirty="0" smtClean="0"/>
           </a:p>
         </p:txBody>
       </p:sp>
     </p:spTree>
     <p:extLst>
       <p:ext uri="{BB962C8B-B14F-4D97-AF65-F5344CB8AC3E}">
-        <p14:creationId xmlns:p14="http://schemas.microsoft.com/office/powerpoint/2010/main" val="2111045107"/>
+        <p14:creationId xmlns:p14="http://schemas.microsoft.com/office/powerpoint/2010/main" val="311261492"/>
       </p:ext>
     </p:extLst>
   </p:cSld>
@@ -5707,7 +5950,7 @@
             </a:r>
             <a:r>
               <a:rPr lang="zh-CN" altLang="en-US" dirty="0" smtClean="0"/>
-              <a:t>调研事项和输入条件收集</a:t>
+              <a:t>输出内容</a:t>
             </a:r>
             <a:r>
               <a:rPr lang="en-US" altLang="zh-CN" dirty="0" smtClean="0"/>
@@ -5729,9 +5972,7 @@
         </p:nvSpPr>
         <p:spPr/>
         <p:txBody>
-          <a:bodyPr>
-            <a:normAutofit fontScale="92500" lnSpcReduction="10000"/>
-          </a:bodyPr>
+          <a:bodyPr/>
           <a:lstStyle/>
           <a:p>
             <a:pPr marL="457200" indent="-457200">
@@ -5739,12 +5980,8 @@
               <a:buAutoNum type="arabicPeriod"/>
             </a:pPr>
             <a:r>
-              <a:rPr lang="zh-CN" altLang="en-US" dirty="0"/>
-              <a:t>方案基础</a:t>
-            </a:r>
-            <a:r>
-              <a:rPr lang="zh-CN" altLang="en-US" dirty="0" smtClean="0"/>
-              <a:t>信息：</a:t>
+              <a:rPr lang="zh-CN" altLang="en-US" dirty="0" smtClean="0"/>
+              <a:t>不同目标下的定价策略</a:t>
             </a:r>
             <a:endParaRPr lang="en-US" altLang="zh-CN" dirty="0" smtClean="0"/>
           </a:p>
@@ -5754,16 +5991,8 @@
               <a:buAutoNum type="arabicPeriod"/>
             </a:pPr>
             <a:r>
-              <a:rPr lang="zh-CN" altLang="en-US" dirty="0"/>
-              <a:t>各单元户数，每户单价、</a:t>
-            </a:r>
-            <a:r>
-              <a:rPr lang="zh-CN" altLang="en-US" dirty="0" smtClean="0"/>
-              <a:t>总价</a:t>
-            </a:r>
-            <a:r>
-              <a:rPr lang="zh-CN" altLang="en-US" dirty="0"/>
-              <a:t>；</a:t>
+              <a:rPr lang="zh-CN" altLang="en-US" dirty="0" smtClean="0"/>
+              <a:t>利润目标；</a:t>
             </a:r>
             <a:endParaRPr lang="en-US" altLang="zh-CN" dirty="0" smtClean="0"/>
           </a:p>
@@ -5773,16 +6002,23 @@
               <a:buAutoNum type="arabicPeriod"/>
             </a:pPr>
             <a:r>
-              <a:rPr lang="zh-CN" altLang="en-US" dirty="0" smtClean="0"/>
-              <a:t>已</a:t>
-            </a:r>
-            <a:r>
               <a:rPr lang="zh-CN" altLang="en-US" dirty="0"/>
-              <a:t>售出每户客户数据</a:t>
-            </a:r>
-            <a:r>
-              <a:rPr lang="zh-CN" altLang="en-US" dirty="0" smtClean="0"/>
-              <a:t>；</a:t>
+              <a:t>一次性</a:t>
+            </a:r>
+            <a:r>
+              <a:rPr lang="zh-CN" altLang="en-US" dirty="0" smtClean="0"/>
+              <a:t>现金流目标；</a:t>
+            </a:r>
+            <a:endParaRPr lang="en-US" altLang="zh-CN" dirty="0" smtClean="0"/>
+          </a:p>
+          <a:p>
+            <a:pPr marL="914400" lvl="1" indent="-457200">
+              <a:buFont typeface="+mj-lt"/>
+              <a:buAutoNum type="arabicPeriod"/>
+            </a:pPr>
+            <a:r>
+              <a:rPr lang="zh-CN" altLang="en-US" dirty="0" smtClean="0"/>
+              <a:t>折中目标等。</a:t>
             </a:r>
             <a:endParaRPr lang="en-US" altLang="zh-CN" dirty="0" smtClean="0"/>
           </a:p>
@@ -5793,7 +6029,29 @@
             </a:pPr>
             <a:r>
               <a:rPr lang="zh-CN" altLang="en-US" dirty="0" smtClean="0"/>
-              <a:t>对成交客户的统计和访谈：</a:t>
+              <a:t>最优定价方案；</a:t>
+            </a:r>
+            <a:endParaRPr lang="en-US" altLang="zh-CN" dirty="0" smtClean="0"/>
+          </a:p>
+          <a:p>
+            <a:pPr lvl="1">
+              <a:buFont typeface="+mj-lt"/>
+              <a:buAutoNum type="arabicPeriod"/>
+            </a:pPr>
+            <a:r>
+              <a:rPr lang="zh-CN" altLang="en-US" dirty="0" smtClean="0"/>
+              <a:t>每个车位在特定时点销售的合理价格；</a:t>
+            </a:r>
+            <a:endParaRPr lang="en-US" altLang="zh-CN" dirty="0" smtClean="0"/>
+          </a:p>
+          <a:p>
+            <a:pPr marL="457200" indent="-457200">
+              <a:buFont typeface="+mj-lt"/>
+              <a:buAutoNum type="arabicPeriod"/>
+            </a:pPr>
+            <a:r>
+              <a:rPr lang="zh-CN" altLang="en-US" dirty="0" smtClean="0"/>
+              <a:t>销控方案：</a:t>
             </a:r>
             <a:endParaRPr lang="en-US" altLang="zh-CN" dirty="0" smtClean="0"/>
           </a:p>
@@ -5804,128 +6062,119 @@
             </a:pPr>
             <a:r>
               <a:rPr lang="zh-CN" altLang="en-US" dirty="0" smtClean="0"/>
-              <a:t>数据：客户基础数据，户型、房子单价、总价；</a:t>
+              <a:t>保持供求关系正常，避免影响后续其他楼栋；</a:t>
             </a:r>
             <a:endParaRPr lang="en-US" altLang="zh-CN" dirty="0" smtClean="0"/>
           </a:p>
           <a:p>
-            <a:pPr marL="914400" lvl="1" indent="-457200">
-              <a:buFont typeface="+mj-lt"/>
-              <a:buAutoNum type="arabicPeriod"/>
-            </a:pPr>
-            <a:r>
-              <a:rPr lang="zh-CN" altLang="en-US" dirty="0" smtClean="0"/>
-              <a:t>问卷：客户家庭人口、汽车数量、汽车品牌，客户需要几个车位；</a:t>
+            <a:pPr marL="457200" indent="-457200"/>
+            <a:r>
+              <a:rPr lang="zh-CN" altLang="en-US" dirty="0" smtClean="0"/>
+              <a:t>特殊车位定价：</a:t>
             </a:r>
             <a:endParaRPr lang="en-US" altLang="zh-CN" dirty="0" smtClean="0"/>
           </a:p>
           <a:p>
-            <a:pPr marL="914400" lvl="1" indent="-457200">
-              <a:buFont typeface="+mj-lt"/>
-              <a:buAutoNum type="arabicPeriod"/>
-            </a:pPr>
-            <a:r>
-              <a:rPr lang="zh-CN" altLang="en-US" dirty="0" smtClean="0"/>
-              <a:t>处理数据，分析客户在城市人口中的相对收入位置</a:t>
+            <a:pPr marL="914400" lvl="1" indent="-457200"/>
+            <a:r>
+              <a:rPr lang="zh-CN" altLang="en-US" dirty="0"/>
+              <a:t>小</a:t>
+            </a:r>
+            <a:r>
+              <a:rPr lang="zh-CN" altLang="en-US" dirty="0" smtClean="0"/>
+              <a:t>车位、子母车位、</a:t>
+            </a:r>
+            <a:r>
+              <a:rPr lang="en-US" altLang="zh-CN" dirty="0" smtClean="0"/>
+              <a:t>VIP</a:t>
+            </a:r>
+            <a:r>
+              <a:rPr lang="zh-CN" altLang="en-US" dirty="0" smtClean="0"/>
+              <a:t>车位等按照各自逻辑定价。</a:t>
             </a:r>
             <a:endParaRPr lang="en-US" altLang="zh-CN" dirty="0" smtClean="0"/>
           </a:p>
-          <a:p>
-            <a:pPr marL="457200" indent="-457200">
-              <a:buFont typeface="+mj-lt"/>
-              <a:buAutoNum type="arabicPeriod"/>
-            </a:pPr>
-            <a:r>
-              <a:rPr lang="zh-CN" altLang="en-US" dirty="0" smtClean="0"/>
-              <a:t>园区外停车供应调研：</a:t>
-            </a:r>
-            <a:endParaRPr lang="en-US" altLang="zh-CN" dirty="0" smtClean="0"/>
-          </a:p>
-          <a:p>
-            <a:pPr marL="914400" lvl="1" indent="-457200">
-              <a:buFont typeface="+mj-lt"/>
-              <a:buAutoNum type="arabicPeriod"/>
-            </a:pPr>
-            <a:r>
-              <a:rPr lang="en-US" altLang="zh-CN" dirty="0" smtClean="0"/>
-              <a:t>500</a:t>
-            </a:r>
-            <a:r>
-              <a:rPr lang="zh-CN" altLang="en-US" dirty="0" smtClean="0"/>
-              <a:t>米内街头停车位数量、价格、交通强制水平；</a:t>
-            </a:r>
-            <a:endParaRPr lang="en-US" altLang="zh-CN" dirty="0" smtClean="0"/>
-          </a:p>
-          <a:p>
-            <a:pPr marL="914400" lvl="1" indent="-457200">
-              <a:buFont typeface="+mj-lt"/>
-              <a:buAutoNum type="arabicPeriod"/>
-            </a:pPr>
-            <a:r>
-              <a:rPr lang="zh-CN" altLang="en-US" dirty="0" smtClean="0"/>
-              <a:t>街道状态的中期预期；</a:t>
-            </a:r>
-            <a:endParaRPr lang="en-US" altLang="zh-CN" dirty="0" smtClean="0"/>
-          </a:p>
-          <a:p>
-            <a:pPr marL="914400" lvl="1" indent="-457200">
-              <a:buFont typeface="+mj-lt"/>
-              <a:buAutoNum type="arabicPeriod"/>
-            </a:pPr>
-            <a:r>
-              <a:rPr lang="zh-CN" altLang="en-US" dirty="0" smtClean="0"/>
-              <a:t>友商售价、社会车位租金、周边小区车位转租价格；</a:t>
-            </a:r>
-            <a:endParaRPr lang="en-US" altLang="zh-CN" dirty="0" smtClean="0"/>
-          </a:p>
-          <a:p>
-            <a:pPr marL="457200" indent="-457200">
-              <a:buFont typeface="+mj-lt"/>
-              <a:buAutoNum type="arabicPeriod"/>
-            </a:pPr>
-            <a:r>
-              <a:rPr lang="zh-CN" altLang="en-US" dirty="0" smtClean="0"/>
-              <a:t>地段信息，重点关注入住率：</a:t>
-            </a:r>
-            <a:endParaRPr lang="en-US" altLang="zh-CN" dirty="0" smtClean="0"/>
-          </a:p>
-          <a:p>
-            <a:pPr marL="457200" lvl="1" indent="0">
-              <a:buNone/>
-            </a:pPr>
-            <a:r>
-              <a:rPr lang="zh-CN" altLang="en-US" dirty="0" smtClean="0"/>
-              <a:t>周边入住率、教育配套、商业配套完善度；</a:t>
-            </a:r>
-            <a:endParaRPr lang="en-US" altLang="zh-CN" dirty="0" smtClean="0"/>
-          </a:p>
-          <a:p>
-            <a:pPr marL="457200" indent="-457200">
-              <a:buFont typeface="+mj-lt"/>
-              <a:buAutoNum type="arabicPeriod"/>
-            </a:pPr>
-            <a:r>
-              <a:rPr lang="zh-CN" altLang="en-US" dirty="0" smtClean="0"/>
-              <a:t>销售计划：</a:t>
-            </a:r>
-            <a:endParaRPr lang="en-US" altLang="zh-CN" dirty="0" smtClean="0"/>
-          </a:p>
-          <a:p>
-            <a:pPr marL="457200" lvl="1" indent="0">
-              <a:buNone/>
-            </a:pPr>
-            <a:r>
-              <a:rPr lang="zh-CN" altLang="en-US" dirty="0" smtClean="0"/>
-              <a:t>住宅销售计划和进度、车位销售目标、车位销控方式</a:t>
-            </a:r>
-            <a:endParaRPr lang="en-US" dirty="0"/>
+        </p:txBody>
+      </p:sp>
+      <p:pic>
+        <p:nvPicPr>
+          <p:cNvPr id="6" name="图片 5"/>
+          <p:cNvPicPr>
+            <a:picLocks noChangeAspect="1"/>
+          </p:cNvPicPr>
+          <p:nvPr/>
+        </p:nvPicPr>
+        <p:blipFill rotWithShape="1">
+          <a:blip r:embed="rId2" cstate="print">
+            <a:extLst>
+              <a:ext uri="{28A0092B-C50C-407E-A947-70E740481C1C}">
+                <a14:useLocalDpi xmlns:a14="http://schemas.microsoft.com/office/drawing/2010/main" val="0"/>
+              </a:ext>
+            </a:extLst>
+          </a:blip>
+          <a:srcRect r="59289" b="55650"/>
+          <a:stretch/>
+        </p:blipFill>
+        <p:spPr>
+          <a:xfrm>
+            <a:off x="7578090" y="365125"/>
+            <a:ext cx="4001226" cy="5811837"/>
+          </a:xfrm>
+          <a:prstGeom prst="rect">
+            <a:avLst/>
+          </a:prstGeom>
+        </p:spPr>
+      </p:pic>
+      <p:sp>
+        <p:nvSpPr>
+          <p:cNvPr id="2" name="矩形 1"/>
+          <p:cNvSpPr/>
+          <p:nvPr/>
+        </p:nvSpPr>
+        <p:spPr>
+          <a:xfrm>
+            <a:off x="7482840" y="269875"/>
+            <a:ext cx="1870710" cy="2540000"/>
+          </a:xfrm>
+          <a:prstGeom prst="rect">
+            <a:avLst/>
+          </a:prstGeom>
+          <a:noFill/>
+          <a:ln>
+            <a:solidFill>
+              <a:srgbClr val="FF0000"/>
+            </a:solidFill>
+          </a:ln>
+        </p:spPr>
+        <p:style>
+          <a:lnRef idx="2">
+            <a:schemeClr val="accent1">
+              <a:shade val="50000"/>
+            </a:schemeClr>
+          </a:lnRef>
+          <a:fillRef idx="1">
+            <a:schemeClr val="accent1"/>
+          </a:fillRef>
+          <a:effectRef idx="0">
+            <a:schemeClr val="accent1"/>
+          </a:effectRef>
+          <a:fontRef idx="minor">
+            <a:schemeClr val="lt1"/>
+          </a:fontRef>
+        </p:style>
+        <p:txBody>
+          <a:bodyPr rtlCol="0" anchor="ctr"/>
+          <a:lstStyle/>
+          <a:p>
+            <a:pPr algn="ctr"/>
+            <a:endParaRPr lang="en-US"/>
           </a:p>
         </p:txBody>
       </p:sp>
     </p:spTree>
     <p:extLst>
       <p:ext uri="{BB962C8B-B14F-4D97-AF65-F5344CB8AC3E}">
-        <p14:creationId xmlns:p14="http://schemas.microsoft.com/office/powerpoint/2010/main" val="1249574181"/>
+        <p14:creationId xmlns:p14="http://schemas.microsoft.com/office/powerpoint/2010/main" val="2104735274"/>
       </p:ext>
     </p:extLst>
   </p:cSld>
@@ -5961,6 +6210,560 @@
       </p:grpSpPr>
       <p:sp>
         <p:nvSpPr>
+          <p:cNvPr id="2" name="标题 1"/>
+          <p:cNvSpPr>
+            <a:spLocks noGrp="1"/>
+          </p:cNvSpPr>
+          <p:nvPr>
+            <p:ph type="title"/>
+          </p:nvPr>
+        </p:nvSpPr>
+        <p:spPr/>
+        <p:txBody>
+          <a:bodyPr/>
+          <a:lstStyle/>
+          <a:p>
+            <a:r>
+              <a:rPr lang="zh-CN" altLang="en-US" dirty="0" smtClean="0"/>
+              <a:t>案例应用</a:t>
+            </a:r>
+            <a:endParaRPr lang="en-US" dirty="0"/>
+          </a:p>
+        </p:txBody>
+      </p:sp>
+      <p:sp>
+        <p:nvSpPr>
+          <p:cNvPr id="3" name="内容占位符 2"/>
+          <p:cNvSpPr>
+            <a:spLocks noGrp="1"/>
+          </p:cNvSpPr>
+          <p:nvPr>
+            <p:ph idx="1"/>
+          </p:nvPr>
+        </p:nvSpPr>
+        <p:spPr/>
+        <p:txBody>
+          <a:bodyPr/>
+          <a:lstStyle/>
+          <a:p>
+            <a:r>
+              <a:rPr lang="zh-CN" altLang="en-US" dirty="0"/>
+              <a:t>车位定价、分期、模拟选车系统。能把局部的供求关系表现得很细，便宜的区域就是周边客户少车位多得地方。用雪山万科城</a:t>
+            </a:r>
+            <a:r>
+              <a:rPr lang="en-US" altLang="zh-CN" dirty="0"/>
+              <a:t>A6</a:t>
+            </a:r>
+            <a:r>
+              <a:rPr lang="zh-CN" altLang="en-US" dirty="0"/>
+              <a:t>做的模拟。根据客户行为。模拟结果</a:t>
+            </a:r>
+            <a:r>
+              <a:rPr lang="zh-CN" altLang="en-US" dirty="0" smtClean="0"/>
+              <a:t>：</a:t>
+            </a:r>
+            <a:endParaRPr lang="en-US" altLang="zh-CN" dirty="0" smtClean="0"/>
+          </a:p>
+          <a:p>
+            <a:pPr lvl="1">
+              <a:buFont typeface="Arial" panose="020B0604020202020204" pitchFamily="34" charset="0"/>
+              <a:buChar char="•"/>
+            </a:pPr>
+            <a:r>
+              <a:rPr lang="zh-CN" altLang="en-US" dirty="0" smtClean="0"/>
+              <a:t>总</a:t>
+            </a:r>
+            <a:r>
+              <a:rPr lang="zh-CN" altLang="en-US" dirty="0"/>
+              <a:t>车位数 </a:t>
+            </a:r>
+            <a:r>
+              <a:rPr lang="en-US" altLang="zh-CN" dirty="0"/>
+              <a:t>: </a:t>
+            </a:r>
+            <a:r>
+              <a:rPr lang="en-US" altLang="zh-CN" dirty="0" smtClean="0"/>
+              <a:t>1460</a:t>
+            </a:r>
+            <a:r>
+              <a:rPr lang="zh-CN" altLang="en-US" dirty="0" smtClean="0"/>
+              <a:t>；</a:t>
+            </a:r>
+            <a:endParaRPr lang="en-US" altLang="zh-CN" dirty="0" smtClean="0"/>
+          </a:p>
+          <a:p>
+            <a:pPr lvl="1">
+              <a:buFont typeface="Arial" panose="020B0604020202020204" pitchFamily="34" charset="0"/>
+              <a:buChar char="•"/>
+            </a:pPr>
+            <a:r>
+              <a:rPr lang="zh-CN" altLang="en-US" dirty="0" smtClean="0"/>
+              <a:t>总</a:t>
+            </a:r>
+            <a:r>
+              <a:rPr lang="zh-CN" altLang="en-US" dirty="0"/>
+              <a:t>户数 </a:t>
+            </a:r>
+            <a:r>
+              <a:rPr lang="en-US" altLang="zh-CN" dirty="0"/>
+              <a:t>: </a:t>
+            </a:r>
+            <a:r>
+              <a:rPr lang="en-US" altLang="zh-CN" dirty="0" smtClean="0"/>
+              <a:t>1296</a:t>
+            </a:r>
+            <a:r>
+              <a:rPr lang="zh-CN" altLang="en-US" dirty="0" smtClean="0"/>
+              <a:t>；</a:t>
+            </a:r>
+            <a:endParaRPr lang="en-US" altLang="zh-CN" dirty="0" smtClean="0"/>
+          </a:p>
+          <a:p>
+            <a:pPr lvl="1">
+              <a:buFont typeface="Arial" panose="020B0604020202020204" pitchFamily="34" charset="0"/>
+              <a:buChar char="•"/>
+            </a:pPr>
+            <a:r>
+              <a:rPr lang="zh-CN" altLang="en-US" dirty="0" smtClean="0"/>
+              <a:t>总</a:t>
+            </a:r>
+            <a:r>
+              <a:rPr lang="zh-CN" altLang="en-US" dirty="0"/>
+              <a:t>售出车位数 </a:t>
+            </a:r>
+            <a:r>
+              <a:rPr lang="en-US" altLang="zh-CN" dirty="0"/>
+              <a:t>: </a:t>
+            </a:r>
+            <a:r>
+              <a:rPr lang="en-US" altLang="zh-CN" dirty="0" smtClean="0"/>
+              <a:t>1136</a:t>
+            </a:r>
+            <a:r>
+              <a:rPr lang="zh-CN" altLang="en-US" dirty="0" smtClean="0"/>
+              <a:t>；</a:t>
+            </a:r>
+            <a:endParaRPr lang="en-US" altLang="zh-CN" dirty="0" smtClean="0"/>
+          </a:p>
+          <a:p>
+            <a:pPr lvl="1">
+              <a:buFont typeface="Arial" panose="020B0604020202020204" pitchFamily="34" charset="0"/>
+              <a:buChar char="•"/>
+            </a:pPr>
+            <a:r>
+              <a:rPr lang="zh-CN" altLang="en-US" dirty="0" smtClean="0"/>
+              <a:t>车位</a:t>
+            </a:r>
+            <a:r>
+              <a:rPr lang="zh-CN" altLang="en-US" dirty="0"/>
+              <a:t>去化</a:t>
+            </a:r>
+            <a:r>
+              <a:rPr lang="zh-CN" altLang="en-US" dirty="0" smtClean="0"/>
+              <a:t>率 </a:t>
+            </a:r>
+            <a:r>
+              <a:rPr lang="en-US" altLang="zh-CN" dirty="0"/>
+              <a:t>: 78</a:t>
+            </a:r>
+            <a:r>
+              <a:rPr lang="en-US" altLang="zh-CN" dirty="0" smtClean="0"/>
+              <a:t>%</a:t>
+            </a:r>
+          </a:p>
+          <a:p>
+            <a:pPr lvl="1">
+              <a:buFont typeface="Arial" panose="020B0604020202020204" pitchFamily="34" charset="0"/>
+              <a:buChar char="•"/>
+            </a:pPr>
+            <a:r>
+              <a:rPr lang="zh-CN" altLang="en-US" dirty="0" smtClean="0"/>
+              <a:t>总</a:t>
+            </a:r>
+            <a:r>
+              <a:rPr lang="zh-CN" altLang="en-US" dirty="0"/>
+              <a:t>销售额 </a:t>
+            </a:r>
+            <a:r>
+              <a:rPr lang="en-US" altLang="zh-CN" dirty="0"/>
+              <a:t>: 12770</a:t>
+            </a:r>
+            <a:r>
+              <a:rPr lang="zh-CN" altLang="en-US" dirty="0"/>
+              <a:t>万</a:t>
+            </a:r>
+            <a:r>
+              <a:rPr lang="zh-CN" altLang="en-US" dirty="0" smtClean="0"/>
+              <a:t>元；</a:t>
+            </a:r>
+            <a:endParaRPr lang="en-US" altLang="zh-CN" dirty="0" smtClean="0"/>
+          </a:p>
+          <a:p>
+            <a:pPr lvl="1">
+              <a:buFont typeface="Arial" panose="020B0604020202020204" pitchFamily="34" charset="0"/>
+              <a:buChar char="•"/>
+            </a:pPr>
+            <a:r>
+              <a:rPr lang="zh-CN" altLang="en-US" dirty="0" smtClean="0"/>
+              <a:t>单车</a:t>
+            </a:r>
+            <a:r>
+              <a:rPr lang="zh-CN" altLang="en-US" dirty="0"/>
+              <a:t>位实现价格 </a:t>
+            </a:r>
+            <a:r>
+              <a:rPr lang="en-US" altLang="zh-CN" dirty="0"/>
+              <a:t>: 11.2</a:t>
+            </a:r>
+            <a:r>
+              <a:rPr lang="zh-CN" altLang="en-US" dirty="0"/>
+              <a:t>万</a:t>
+            </a:r>
+            <a:r>
+              <a:rPr lang="zh-CN" altLang="en-US" dirty="0" smtClean="0"/>
+              <a:t>元；</a:t>
+            </a:r>
+            <a:endParaRPr lang="en-US" altLang="zh-CN" dirty="0" smtClean="0"/>
+          </a:p>
+          <a:p>
+            <a:pPr lvl="1">
+              <a:buFont typeface="Arial" panose="020B0604020202020204" pitchFamily="34" charset="0"/>
+              <a:buChar char="•"/>
+            </a:pPr>
+            <a:r>
+              <a:rPr lang="zh-CN" altLang="en-US" dirty="0" smtClean="0"/>
+              <a:t>客户</a:t>
+            </a:r>
+            <a:r>
+              <a:rPr lang="zh-CN" altLang="en-US" dirty="0"/>
+              <a:t>需求车位总数</a:t>
+            </a:r>
+            <a:r>
+              <a:rPr lang="en-US" altLang="zh-CN" dirty="0" smtClean="0"/>
+              <a:t>1257</a:t>
+            </a:r>
+            <a:r>
+              <a:rPr lang="zh-CN" altLang="en-US" dirty="0" smtClean="0"/>
+              <a:t>。</a:t>
+            </a:r>
+            <a:endParaRPr lang="en-US" dirty="0"/>
+          </a:p>
+        </p:txBody>
+      </p:sp>
+    </p:spTree>
+    <p:extLst>
+      <p:ext uri="{BB962C8B-B14F-4D97-AF65-F5344CB8AC3E}">
+        <p14:creationId xmlns:p14="http://schemas.microsoft.com/office/powerpoint/2010/main" val="2111045107"/>
+      </p:ext>
+    </p:extLst>
+  </p:cSld>
+  <p:clrMapOvr>
+    <a:masterClrMapping/>
+  </p:clrMapOvr>
+  <p:timing>
+    <p:tnLst>
+      <p:par>
+        <p:cTn id="1" dur="indefinite" restart="never" nodeType="tmRoot"/>
+      </p:par>
+    </p:tnLst>
+  </p:timing>
+</p:sld>
+</file>
+
+<file path=ppt/slides/slide16.xml><?xml version="1.0" encoding="utf-8"?>
+<p:sld xmlns:a="http://schemas.openxmlformats.org/drawingml/2006/main" xmlns:r="http://schemas.openxmlformats.org/officeDocument/2006/relationships" xmlns:p="http://schemas.openxmlformats.org/presentationml/2006/main">
+  <p:cSld>
+    <p:spTree>
+      <p:nvGrpSpPr>
+        <p:cNvPr id="1" name=""/>
+        <p:cNvGrpSpPr/>
+        <p:nvPr/>
+      </p:nvGrpSpPr>
+      <p:grpSpPr>
+        <a:xfrm>
+          <a:off x="0" y="0"/>
+          <a:ext cx="0" cy="0"/>
+          <a:chOff x="0" y="0"/>
+          <a:chExt cx="0" cy="0"/>
+        </a:xfrm>
+      </p:grpSpPr>
+      <p:sp>
+        <p:nvSpPr>
+          <p:cNvPr id="4" name="标题 3"/>
+          <p:cNvSpPr>
+            <a:spLocks noGrp="1"/>
+          </p:cNvSpPr>
+          <p:nvPr>
+            <p:ph type="title"/>
+          </p:nvPr>
+        </p:nvSpPr>
+        <p:spPr/>
+        <p:txBody>
+          <a:bodyPr>
+            <a:normAutofit/>
+          </a:bodyPr>
+          <a:lstStyle/>
+          <a:p>
+            <a:r>
+              <a:rPr lang="en-US" altLang="zh-CN" dirty="0" smtClean="0"/>
+              <a:t>【</a:t>
+            </a:r>
+            <a:r>
+              <a:rPr lang="zh-CN" altLang="en-US" dirty="0" smtClean="0"/>
+              <a:t>调研事项和输入条件收集</a:t>
+            </a:r>
+            <a:r>
+              <a:rPr lang="en-US" altLang="zh-CN" dirty="0" smtClean="0"/>
+              <a:t>】</a:t>
+            </a:r>
+            <a:endParaRPr lang="en-US" dirty="0"/>
+          </a:p>
+        </p:txBody>
+      </p:sp>
+      <p:sp>
+        <p:nvSpPr>
+          <p:cNvPr id="5" name="内容占位符 4"/>
+          <p:cNvSpPr>
+            <a:spLocks noGrp="1"/>
+          </p:cNvSpPr>
+          <p:nvPr>
+            <p:ph idx="1"/>
+          </p:nvPr>
+        </p:nvSpPr>
+        <p:spPr/>
+        <p:txBody>
+          <a:bodyPr>
+            <a:normAutofit fontScale="92500" lnSpcReduction="10000"/>
+          </a:bodyPr>
+          <a:lstStyle/>
+          <a:p>
+            <a:pPr marL="457200" indent="-457200">
+              <a:buFont typeface="+mj-lt"/>
+              <a:buAutoNum type="arabicPeriod"/>
+            </a:pPr>
+            <a:r>
+              <a:rPr lang="zh-CN" altLang="en-US" dirty="0"/>
+              <a:t>方案基础</a:t>
+            </a:r>
+            <a:r>
+              <a:rPr lang="zh-CN" altLang="en-US" dirty="0" smtClean="0"/>
+              <a:t>信息：</a:t>
+            </a:r>
+            <a:endParaRPr lang="en-US" altLang="zh-CN" dirty="0" smtClean="0"/>
+          </a:p>
+          <a:p>
+            <a:pPr marL="914400" lvl="1" indent="-457200">
+              <a:buFont typeface="+mj-lt"/>
+              <a:buAutoNum type="arabicPeriod"/>
+            </a:pPr>
+            <a:r>
+              <a:rPr lang="zh-CN" altLang="en-US" dirty="0"/>
+              <a:t>各单元户数，每户单价、</a:t>
+            </a:r>
+            <a:r>
+              <a:rPr lang="zh-CN" altLang="en-US" dirty="0" smtClean="0"/>
+              <a:t>总价</a:t>
+            </a:r>
+            <a:r>
+              <a:rPr lang="zh-CN" altLang="en-US" dirty="0"/>
+              <a:t>；</a:t>
+            </a:r>
+            <a:endParaRPr lang="en-US" altLang="zh-CN" dirty="0" smtClean="0"/>
+          </a:p>
+          <a:p>
+            <a:pPr marL="914400" lvl="1" indent="-457200">
+              <a:buFont typeface="+mj-lt"/>
+              <a:buAutoNum type="arabicPeriod"/>
+            </a:pPr>
+            <a:r>
+              <a:rPr lang="zh-CN" altLang="en-US" dirty="0" smtClean="0"/>
+              <a:t>已</a:t>
+            </a:r>
+            <a:r>
+              <a:rPr lang="zh-CN" altLang="en-US" dirty="0"/>
+              <a:t>售出每户客户数据</a:t>
+            </a:r>
+            <a:r>
+              <a:rPr lang="zh-CN" altLang="en-US" dirty="0" smtClean="0"/>
+              <a:t>；</a:t>
+            </a:r>
+            <a:endParaRPr lang="en-US" altLang="zh-CN" dirty="0" smtClean="0"/>
+          </a:p>
+          <a:p>
+            <a:pPr marL="457200" indent="-457200">
+              <a:buFont typeface="+mj-lt"/>
+              <a:buAutoNum type="arabicPeriod"/>
+            </a:pPr>
+            <a:r>
+              <a:rPr lang="zh-CN" altLang="en-US" dirty="0" smtClean="0"/>
+              <a:t>对成交客户的统计和访谈：</a:t>
+            </a:r>
+            <a:endParaRPr lang="en-US" altLang="zh-CN" dirty="0" smtClean="0"/>
+          </a:p>
+          <a:p>
+            <a:pPr marL="914400" lvl="1" indent="-457200">
+              <a:buFont typeface="+mj-lt"/>
+              <a:buAutoNum type="arabicPeriod"/>
+            </a:pPr>
+            <a:r>
+              <a:rPr lang="zh-CN" altLang="en-US" dirty="0" smtClean="0"/>
+              <a:t>数据：客户基础数据，户型、房子单价、总价；</a:t>
+            </a:r>
+            <a:endParaRPr lang="en-US" altLang="zh-CN" dirty="0" smtClean="0"/>
+          </a:p>
+          <a:p>
+            <a:pPr marL="914400" lvl="1" indent="-457200">
+              <a:buFont typeface="+mj-lt"/>
+              <a:buAutoNum type="arabicPeriod"/>
+            </a:pPr>
+            <a:r>
+              <a:rPr lang="zh-CN" altLang="en-US" dirty="0" smtClean="0"/>
+              <a:t>问卷：客户家庭人口、汽车数量、汽车品牌，客户需要几个车位；</a:t>
+            </a:r>
+            <a:endParaRPr lang="en-US" altLang="zh-CN" dirty="0" smtClean="0"/>
+          </a:p>
+          <a:p>
+            <a:pPr marL="914400" lvl="1" indent="-457200">
+              <a:buFont typeface="+mj-lt"/>
+              <a:buAutoNum type="arabicPeriod"/>
+            </a:pPr>
+            <a:r>
+              <a:rPr lang="zh-CN" altLang="en-US" dirty="0" smtClean="0"/>
+              <a:t>处理数据，分析客户在城市人口中的相对收入位置</a:t>
+            </a:r>
+            <a:endParaRPr lang="en-US" altLang="zh-CN" dirty="0" smtClean="0"/>
+          </a:p>
+          <a:p>
+            <a:pPr marL="457200" indent="-457200">
+              <a:buFont typeface="+mj-lt"/>
+              <a:buAutoNum type="arabicPeriod"/>
+            </a:pPr>
+            <a:r>
+              <a:rPr lang="zh-CN" altLang="en-US" dirty="0" smtClean="0"/>
+              <a:t>园区外停车供应调研：</a:t>
+            </a:r>
+            <a:endParaRPr lang="en-US" altLang="zh-CN" dirty="0" smtClean="0"/>
+          </a:p>
+          <a:p>
+            <a:pPr marL="914400" lvl="1" indent="-457200">
+              <a:buFont typeface="+mj-lt"/>
+              <a:buAutoNum type="arabicPeriod"/>
+            </a:pPr>
+            <a:r>
+              <a:rPr lang="en-US" altLang="zh-CN" dirty="0" smtClean="0"/>
+              <a:t>500</a:t>
+            </a:r>
+            <a:r>
+              <a:rPr lang="zh-CN" altLang="en-US" dirty="0" smtClean="0"/>
+              <a:t>米内街头停车位数量、价格、交通强制水平；</a:t>
+            </a:r>
+            <a:endParaRPr lang="en-US" altLang="zh-CN" dirty="0" smtClean="0"/>
+          </a:p>
+          <a:p>
+            <a:pPr marL="914400" lvl="1" indent="-457200">
+              <a:buFont typeface="+mj-lt"/>
+              <a:buAutoNum type="arabicPeriod"/>
+            </a:pPr>
+            <a:r>
+              <a:rPr lang="zh-CN" altLang="en-US" dirty="0" smtClean="0"/>
+              <a:t>街道状态的中期预期；</a:t>
+            </a:r>
+            <a:endParaRPr lang="en-US" altLang="zh-CN" dirty="0" smtClean="0"/>
+          </a:p>
+          <a:p>
+            <a:pPr marL="914400" lvl="1" indent="-457200">
+              <a:buFont typeface="+mj-lt"/>
+              <a:buAutoNum type="arabicPeriod"/>
+            </a:pPr>
+            <a:r>
+              <a:rPr lang="zh-CN" altLang="en-US" dirty="0" smtClean="0"/>
+              <a:t>友商售价、社会车位租金、周边小区车位转租价格；</a:t>
+            </a:r>
+            <a:endParaRPr lang="en-US" altLang="zh-CN" dirty="0" smtClean="0"/>
+          </a:p>
+          <a:p>
+            <a:pPr marL="457200" indent="-457200">
+              <a:buFont typeface="+mj-lt"/>
+              <a:buAutoNum type="arabicPeriod"/>
+            </a:pPr>
+            <a:r>
+              <a:rPr lang="zh-CN" altLang="en-US" dirty="0" smtClean="0"/>
+              <a:t>地段信息，重点关注入住率：</a:t>
+            </a:r>
+            <a:endParaRPr lang="en-US" altLang="zh-CN" dirty="0" smtClean="0"/>
+          </a:p>
+          <a:p>
+            <a:pPr marL="457200" lvl="1" indent="0">
+              <a:buNone/>
+            </a:pPr>
+            <a:r>
+              <a:rPr lang="zh-CN" altLang="en-US" dirty="0" smtClean="0"/>
+              <a:t>周边入住率、教育配套、商业配套完善度；</a:t>
+            </a:r>
+            <a:endParaRPr lang="en-US" altLang="zh-CN" dirty="0" smtClean="0"/>
+          </a:p>
+          <a:p>
+            <a:pPr marL="457200" indent="-457200">
+              <a:buFont typeface="+mj-lt"/>
+              <a:buAutoNum type="arabicPeriod"/>
+            </a:pPr>
+            <a:r>
+              <a:rPr lang="zh-CN" altLang="en-US" dirty="0" smtClean="0"/>
+              <a:t>销售计划：</a:t>
+            </a:r>
+            <a:endParaRPr lang="en-US" altLang="zh-CN" dirty="0" smtClean="0"/>
+          </a:p>
+          <a:p>
+            <a:pPr marL="457200" lvl="1" indent="0">
+              <a:buNone/>
+            </a:pPr>
+            <a:r>
+              <a:rPr lang="zh-CN" altLang="en-US" dirty="0" smtClean="0"/>
+              <a:t>住宅销售计划和进度、车位销售目标、车位销控方式</a:t>
+            </a:r>
+            <a:endParaRPr lang="en-US" dirty="0"/>
+          </a:p>
+        </p:txBody>
+      </p:sp>
+    </p:spTree>
+    <p:extLst>
+      <p:ext uri="{BB962C8B-B14F-4D97-AF65-F5344CB8AC3E}">
+        <p14:creationId xmlns:p14="http://schemas.microsoft.com/office/powerpoint/2010/main" val="1249574181"/>
+      </p:ext>
+    </p:extLst>
+  </p:cSld>
+  <p:clrMapOvr>
+    <a:masterClrMapping/>
+  </p:clrMapOvr>
+  <p:timing>
+    <p:tnLst>
+      <p:par>
+        <p:cTn id="1" dur="indefinite" restart="never" nodeType="tmRoot"/>
+      </p:par>
+    </p:tnLst>
+  </p:timing>
+</p:sld>
+</file>
+
+<file path=ppt/slides/slide17.xml><?xml version="1.0" encoding="utf-8"?>
+<p:sld xmlns:a="http://schemas.openxmlformats.org/drawingml/2006/main" xmlns:r="http://schemas.openxmlformats.org/officeDocument/2006/relationships" xmlns:p="http://schemas.openxmlformats.org/presentationml/2006/main">
+  <p:cSld>
+    <p:spTree>
+      <p:nvGrpSpPr>
+        <p:cNvPr id="1" name=""/>
+        <p:cNvGrpSpPr/>
+        <p:nvPr/>
+      </p:nvGrpSpPr>
+      <p:grpSpPr>
+        <a:xfrm>
+          <a:off x="0" y="0"/>
+          <a:ext cx="0" cy="0"/>
+          <a:chOff x="0" y="0"/>
+          <a:chExt cx="0" cy="0"/>
+        </a:xfrm>
+      </p:grpSpPr>
+      <p:sp>
+        <p:nvSpPr>
           <p:cNvPr id="4" name="标题 3"/>
           <p:cNvSpPr>
             <a:spLocks noGrp="1"/>
@@ -6156,7 +6959,7 @@
 </p:sld>
 </file>
 
-<file path=ppt/slides/slide16.xml><?xml version="1.0" encoding="utf-8"?>
+<file path=ppt/slides/slide18.xml><?xml version="1.0" encoding="utf-8"?>
 <p:sld xmlns:a="http://schemas.openxmlformats.org/drawingml/2006/main" xmlns:r="http://schemas.openxmlformats.org/officeDocument/2006/relationships" xmlns:p="http://schemas.openxmlformats.org/presentationml/2006/main">
   <p:cSld>
     <p:spTree>
@@ -6524,7 +7327,15 @@
             </a:r>
             <a:r>
               <a:rPr lang="zh-CN" altLang="en-US" dirty="0" smtClean="0"/>
-              <a:t>年一季度，北京区域车位库存约</a:t>
+              <a:t>年一季度</a:t>
+            </a:r>
+            <a:r>
+              <a:rPr lang="zh-CN" altLang="en-US" dirty="0" smtClean="0"/>
+              <a:t>，区域</a:t>
+            </a:r>
+            <a:r>
+              <a:rPr lang="zh-CN" altLang="en-US" dirty="0" smtClean="0"/>
+              <a:t>车位库存约</a:t>
             </a:r>
             <a:r>
               <a:rPr lang="en-US" altLang="zh-CN" dirty="0" smtClean="0"/>

</xml_diff>